<commit_message>
latest slides for JKZ (Sessions 2/3)
</commit_message>
<xml_diff>
--- a/training/slides/ROS-I Basic Developers Training - Session 2(Hydro).pptx
+++ b/training/slides/ROS-I Basic Developers Training - Session 2(Hydro).pptx
@@ -6,10 +6,10 @@
     <p:sldMasterId id="2147483660" r:id="rId2"/>
   </p:sldMasterIdLst>
   <p:notesMasterIdLst>
-    <p:notesMasterId r:id="rId28"/>
+    <p:notesMasterId r:id="rId29"/>
   </p:notesMasterIdLst>
   <p:handoutMasterIdLst>
-    <p:handoutMasterId r:id="rId29"/>
+    <p:handoutMasterId r:id="rId30"/>
   </p:handoutMasterIdLst>
   <p:sldIdLst>
     <p:sldId id="258" r:id="rId3"/>
@@ -36,7 +36,8 @@
     <p:sldId id="304" r:id="rId24"/>
     <p:sldId id="305" r:id="rId25"/>
     <p:sldId id="307" r:id="rId26"/>
-    <p:sldId id="267" r:id="rId27"/>
+    <p:sldId id="320" r:id="rId27"/>
+    <p:sldId id="267" r:id="rId28"/>
   </p:sldIdLst>
   <p:sldSz cx="9144000" cy="6858000" type="screen4x3"/>
   <p:notesSz cx="6858000" cy="9144000"/>
@@ -227,7 +228,7 @@
             <a:fld id="{7CBAD3B9-CF90-4638-A87B-F1F739FB7DFD}" type="datetimeFigureOut">
               <a:rPr lang="en-US" smtClean="0"/>
               <a:pPr/>
-              <a:t>5/14/14</a:t>
+              <a:t>5/16/2014</a:t>
             </a:fld>
             <a:endParaRPr lang="en-US" dirty="0"/>
           </a:p>
@@ -303,7 +304,7 @@
     </p:spTree>
     <p:extLst>
       <p:ext uri="{BB962C8B-B14F-4D97-AF65-F5344CB8AC3E}">
-        <p14:creationId xmlns:p14="http://schemas.microsoft.com/office/powerpoint/2010/main" val="3583592921"/>
+        <p14:creationId xmlns="" xmlns:p14="http://schemas.microsoft.com/office/powerpoint/2010/main" val="3583592921"/>
       </p:ext>
     </p:extLst>
   </p:cSld>
@@ -394,7 +395,7 @@
             <a:fld id="{81EF7E27-DD55-49D9-943B-4056DEC7F6AA}" type="datetimeFigureOut">
               <a:rPr lang="en-US" smtClean="0"/>
               <a:pPr/>
-              <a:t>5/14/14</a:t>
+              <a:t>5/16/2014</a:t>
             </a:fld>
             <a:endParaRPr lang="en-US" dirty="0"/>
           </a:p>
@@ -563,7 +564,7 @@
     </p:spTree>
     <p:extLst>
       <p:ext uri="{BB962C8B-B14F-4D97-AF65-F5344CB8AC3E}">
-        <p14:creationId xmlns:p14="http://schemas.microsoft.com/office/powerpoint/2010/main" val="826930666"/>
+        <p14:creationId xmlns="" xmlns:p14="http://schemas.microsoft.com/office/powerpoint/2010/main" val="826930666"/>
       </p:ext>
     </p:extLst>
   </p:cSld>
@@ -787,7 +788,7 @@
           <a:lstStyle/>
           <a:p>
             <a:r>
-              <a:rPr lang="en-US" dirty="0" smtClean="0"/>
+              <a:rPr lang="en-US" smtClean="0"/>
               <a:t>May 2014</a:t>
             </a:r>
             <a:endParaRPr lang="en-US" dirty="0"/>
@@ -862,7 +863,7 @@
     </p:spTree>
     <p:extLst>
       <p:ext uri="{BB962C8B-B14F-4D97-AF65-F5344CB8AC3E}">
-        <p14:creationId xmlns:p14="http://schemas.microsoft.com/office/powerpoint/2010/main" val="3813574213"/>
+        <p14:creationId xmlns="" xmlns:p14="http://schemas.microsoft.com/office/powerpoint/2010/main" val="3813574213"/>
       </p:ext>
     </p:extLst>
   </p:cSld>
@@ -872,7 +873,7 @@
   <p:timing>
     <p:tnLst>
       <p:par>
-        <p:cTn xmlns:p14="http://schemas.microsoft.com/office/powerpoint/2010/main" id="1" dur="indefinite" restart="never" nodeType="tmRoot"/>
+        <p:cTn id="1" dur="indefinite" restart="never" nodeType="tmRoot"/>
       </p:par>
     </p:tnLst>
   </p:timing>
@@ -1003,7 +1004,7 @@
           <a:lstStyle/>
           <a:p>
             <a:r>
-              <a:rPr lang="en-US" dirty="0" smtClean="0"/>
+              <a:rPr lang="en-US" smtClean="0"/>
               <a:t>May 2014</a:t>
             </a:r>
             <a:endParaRPr lang="en-US" dirty="0"/>
@@ -1078,7 +1079,7 @@
     </p:spTree>
     <p:extLst>
       <p:ext uri="{BB962C8B-B14F-4D97-AF65-F5344CB8AC3E}">
-        <p14:creationId xmlns:p14="http://schemas.microsoft.com/office/powerpoint/2010/main" val="1095070012"/>
+        <p14:creationId xmlns="" xmlns:p14="http://schemas.microsoft.com/office/powerpoint/2010/main" val="1095070012"/>
       </p:ext>
     </p:extLst>
   </p:cSld>
@@ -1181,7 +1182,7 @@
           </a:lstStyle>
           <a:p>
             <a:r>
-              <a:rPr lang="en-US" dirty="0" smtClean="0"/>
+              <a:rPr lang="en-US" smtClean="0"/>
               <a:t>May 2014</a:t>
             </a:r>
             <a:endParaRPr lang="en-US" dirty="0"/>
@@ -1232,7 +1233,7 @@
     </p:spTree>
     <p:extLst>
       <p:ext uri="{BB962C8B-B14F-4D97-AF65-F5344CB8AC3E}">
-        <p14:creationId xmlns:p14="http://schemas.microsoft.com/office/powerpoint/2010/main" val="1888219451"/>
+        <p14:creationId xmlns="" xmlns:p14="http://schemas.microsoft.com/office/powerpoint/2010/main" val="1888219451"/>
       </p:ext>
     </p:extLst>
   </p:cSld>
@@ -1335,7 +1336,7 @@
           </a:lstStyle>
           <a:p>
             <a:r>
-              <a:rPr lang="en-US" dirty="0" smtClean="0"/>
+              <a:rPr lang="en-US" smtClean="0"/>
               <a:t>May 2014</a:t>
             </a:r>
             <a:endParaRPr lang="en-US" dirty="0"/>
@@ -1386,7 +1387,7 @@
     </p:spTree>
     <p:extLst>
       <p:ext uri="{BB962C8B-B14F-4D97-AF65-F5344CB8AC3E}">
-        <p14:creationId xmlns:p14="http://schemas.microsoft.com/office/powerpoint/2010/main" val="1888219451"/>
+        <p14:creationId xmlns="" xmlns:p14="http://schemas.microsoft.com/office/powerpoint/2010/main" val="1888219451"/>
       </p:ext>
     </p:extLst>
   </p:cSld>
@@ -1586,7 +1587,7 @@
           <a:lstStyle/>
           <a:p>
             <a:r>
-              <a:rPr lang="en-US" dirty="0" smtClean="0"/>
+              <a:rPr lang="en-US" smtClean="0"/>
               <a:t>May 2014</a:t>
             </a:r>
             <a:endParaRPr lang="en-US" dirty="0"/>
@@ -1661,7 +1662,7 @@
     </p:spTree>
     <p:extLst>
       <p:ext uri="{BB962C8B-B14F-4D97-AF65-F5344CB8AC3E}">
-        <p14:creationId xmlns:p14="http://schemas.microsoft.com/office/powerpoint/2010/main" val="2350907330"/>
+        <p14:creationId xmlns="" xmlns:p14="http://schemas.microsoft.com/office/powerpoint/2010/main" val="2350907330"/>
       </p:ext>
     </p:extLst>
   </p:cSld>
@@ -1911,7 +1912,7 @@
           <a:lstStyle/>
           <a:p>
             <a:r>
-              <a:rPr lang="en-US" dirty="0" smtClean="0"/>
+              <a:rPr lang="en-US" smtClean="0"/>
               <a:t>May 2014</a:t>
             </a:r>
             <a:endParaRPr lang="en-US" dirty="0"/>
@@ -1986,7 +1987,7 @@
     </p:spTree>
     <p:extLst>
       <p:ext uri="{BB962C8B-B14F-4D97-AF65-F5344CB8AC3E}">
-        <p14:creationId xmlns:p14="http://schemas.microsoft.com/office/powerpoint/2010/main" val="1786395087"/>
+        <p14:creationId xmlns="" xmlns:p14="http://schemas.microsoft.com/office/powerpoint/2010/main" val="1786395087"/>
       </p:ext>
     </p:extLst>
   </p:cSld>
@@ -2376,7 +2377,7 @@
           <a:lstStyle/>
           <a:p>
             <a:r>
-              <a:rPr lang="en-US" dirty="0" smtClean="0"/>
+              <a:rPr lang="en-US" smtClean="0"/>
               <a:t>May 2014</a:t>
             </a:r>
             <a:endParaRPr lang="en-US" dirty="0"/>
@@ -2451,7 +2452,7 @@
     </p:spTree>
     <p:extLst>
       <p:ext uri="{BB962C8B-B14F-4D97-AF65-F5344CB8AC3E}">
-        <p14:creationId xmlns:p14="http://schemas.microsoft.com/office/powerpoint/2010/main" val="2555421727"/>
+        <p14:creationId xmlns="" xmlns:p14="http://schemas.microsoft.com/office/powerpoint/2010/main" val="2555421727"/>
       </p:ext>
     </p:extLst>
   </p:cSld>
@@ -2525,7 +2526,7 @@
           <a:lstStyle/>
           <a:p>
             <a:r>
-              <a:rPr lang="en-US" dirty="0" smtClean="0"/>
+              <a:rPr lang="en-US" smtClean="0"/>
               <a:t>May 2014</a:t>
             </a:r>
             <a:endParaRPr lang="en-US" dirty="0"/>
@@ -2600,7 +2601,7 @@
     </p:spTree>
     <p:extLst>
       <p:ext uri="{BB962C8B-B14F-4D97-AF65-F5344CB8AC3E}">
-        <p14:creationId xmlns:p14="http://schemas.microsoft.com/office/powerpoint/2010/main" val="2138443448"/>
+        <p14:creationId xmlns="" xmlns:p14="http://schemas.microsoft.com/office/powerpoint/2010/main" val="2138443448"/>
       </p:ext>
     </p:extLst>
   </p:cSld>
@@ -2610,7 +2611,7 @@
   <p:timing>
     <p:tnLst>
       <p:par>
-        <p:cTn xmlns:p14="http://schemas.microsoft.com/office/powerpoint/2010/main" id="1" dur="indefinite" restart="never" nodeType="tmRoot"/>
+        <p:cTn id="1" dur="indefinite" restart="never" nodeType="tmRoot"/>
       </p:par>
     </p:tnLst>
   </p:timing>
@@ -2650,7 +2651,7 @@
           <a:lstStyle/>
           <a:p>
             <a:r>
-              <a:rPr lang="en-US" dirty="0" smtClean="0"/>
+              <a:rPr lang="en-US" smtClean="0"/>
               <a:t>May 2014</a:t>
             </a:r>
             <a:endParaRPr lang="en-US" dirty="0"/>
@@ -2725,7 +2726,7 @@
     </p:spTree>
     <p:extLst>
       <p:ext uri="{BB962C8B-B14F-4D97-AF65-F5344CB8AC3E}">
-        <p14:creationId xmlns:p14="http://schemas.microsoft.com/office/powerpoint/2010/main" val="2720892742"/>
+        <p14:creationId xmlns="" xmlns:p14="http://schemas.microsoft.com/office/powerpoint/2010/main" val="2720892742"/>
       </p:ext>
     </p:extLst>
   </p:cSld>
@@ -2735,7 +2736,7 @@
   <p:timing>
     <p:tnLst>
       <p:par>
-        <p:cTn xmlns:p14="http://schemas.microsoft.com/office/powerpoint/2010/main" id="1" dur="indefinite" restart="never" nodeType="tmRoot"/>
+        <p:cTn id="1" dur="indefinite" restart="never" nodeType="tmRoot"/>
       </p:par>
     </p:tnLst>
   </p:timing>
@@ -2966,7 +2967,7 @@
           <a:lstStyle/>
           <a:p>
             <a:r>
-              <a:rPr lang="en-US" dirty="0" smtClean="0"/>
+              <a:rPr lang="en-US" smtClean="0"/>
               <a:t>May 2014</a:t>
             </a:r>
             <a:endParaRPr lang="en-US" dirty="0"/>
@@ -3041,7 +3042,7 @@
     </p:spTree>
     <p:extLst>
       <p:ext uri="{BB962C8B-B14F-4D97-AF65-F5344CB8AC3E}">
-        <p14:creationId xmlns:p14="http://schemas.microsoft.com/office/powerpoint/2010/main" val="2373661346"/>
+        <p14:creationId xmlns="" xmlns:p14="http://schemas.microsoft.com/office/powerpoint/2010/main" val="2373661346"/>
       </p:ext>
     </p:extLst>
   </p:cSld>
@@ -3255,7 +3256,7 @@
           <a:lstStyle/>
           <a:p>
             <a:r>
-              <a:rPr lang="en-US" dirty="0" smtClean="0"/>
+              <a:rPr lang="en-US" smtClean="0"/>
               <a:t>May 2014</a:t>
             </a:r>
             <a:endParaRPr lang="en-US" dirty="0"/>
@@ -3330,7 +3331,7 @@
     </p:spTree>
     <p:extLst>
       <p:ext uri="{BB962C8B-B14F-4D97-AF65-F5344CB8AC3E}">
-        <p14:creationId xmlns:p14="http://schemas.microsoft.com/office/powerpoint/2010/main" val="748455470"/>
+        <p14:creationId xmlns="" xmlns:p14="http://schemas.microsoft.com/office/powerpoint/2010/main" val="748455470"/>
       </p:ext>
     </p:extLst>
   </p:cSld>
@@ -3464,7 +3465,7 @@
           <a:lstStyle/>
           <a:p>
             <a:r>
-              <a:rPr lang="en-US" dirty="0" smtClean="0"/>
+              <a:rPr lang="en-US" smtClean="0"/>
               <a:t>May 2014</a:t>
             </a:r>
             <a:endParaRPr lang="en-US" dirty="0"/>
@@ -3539,7 +3540,7 @@
     </p:spTree>
     <p:extLst>
       <p:ext uri="{BB962C8B-B14F-4D97-AF65-F5344CB8AC3E}">
-        <p14:creationId xmlns:p14="http://schemas.microsoft.com/office/powerpoint/2010/main" val="4079591147"/>
+        <p14:creationId xmlns="" xmlns:p14="http://schemas.microsoft.com/office/powerpoint/2010/main" val="4079591147"/>
       </p:ext>
     </p:extLst>
   </p:cSld>
@@ -3629,7 +3630,7 @@
           </a:lstStyle>
           <a:p>
             <a:r>
-              <a:rPr lang="en-US" dirty="0" smtClean="0"/>
+              <a:rPr lang="en-US" smtClean="0"/>
               <a:t>May 2014</a:t>
             </a:r>
             <a:endParaRPr lang="en-US" dirty="0"/>
@@ -3784,7 +3785,7 @@
     </p:spTree>
     <p:extLst>
       <p:ext uri="{BB962C8B-B14F-4D97-AF65-F5344CB8AC3E}">
-        <p14:creationId xmlns:p14="http://schemas.microsoft.com/office/powerpoint/2010/main" val="2503128900"/>
+        <p14:creationId xmlns="" xmlns:p14="http://schemas.microsoft.com/office/powerpoint/2010/main" val="2503128900"/>
       </p:ext>
     </p:extLst>
   </p:cSld>
@@ -3805,11 +3806,11 @@
   <p:timing>
     <p:tnLst>
       <p:par>
-        <p:cTn xmlns:p14="http://schemas.microsoft.com/office/powerpoint/2010/main" id="1" dur="indefinite" restart="never" nodeType="tmRoot"/>
+        <p:cTn id="1" dur="indefinite" restart="never" nodeType="tmRoot"/>
       </p:par>
     </p:tnLst>
   </p:timing>
-  <p:hf hdr="0"/>
+  <p:hf hdr="0" ftr="0"/>
   <p:txStyles>
     <p:titleStyle>
       <a:lvl1pPr algn="ctr" defTabSz="914400" rtl="0" eaLnBrk="1" latinLnBrk="0" hangingPunct="1">
@@ -4185,7 +4186,7 @@
           </a:lstStyle>
           <a:p>
             <a:r>
-              <a:rPr lang="en-US" dirty="0" smtClean="0"/>
+              <a:rPr lang="en-US" smtClean="0"/>
               <a:t>May 2014</a:t>
             </a:r>
             <a:endParaRPr lang="en-US" dirty="0"/>
@@ -4236,7 +4237,7 @@
     </p:spTree>
     <p:extLst>
       <p:ext uri="{BB962C8B-B14F-4D97-AF65-F5344CB8AC3E}">
-        <p14:creationId xmlns:p14="http://schemas.microsoft.com/office/powerpoint/2010/main" val="2210403510"/>
+        <p14:creationId xmlns="" xmlns:p14="http://schemas.microsoft.com/office/powerpoint/2010/main" val="2210403510"/>
       </p:ext>
     </p:extLst>
   </p:cSld>
@@ -4247,11 +4248,11 @@
   <p:timing>
     <p:tnLst>
       <p:par>
-        <p:cTn xmlns:p14="http://schemas.microsoft.com/office/powerpoint/2010/main" id="1" dur="indefinite" restart="never" nodeType="tmRoot"/>
+        <p:cTn id="1" dur="indefinite" restart="never" nodeType="tmRoot"/>
       </p:par>
     </p:tnLst>
   </p:timing>
-  <p:hf hdr="0"/>
+  <p:hf hdr="0" ftr="0"/>
   <p:txStyles>
     <p:titleStyle>
       <a:lvl1pPr algn="ctr" defTabSz="914400" rtl="0" eaLnBrk="1" latinLnBrk="0" hangingPunct="1">
@@ -4659,7 +4660,7 @@
         <p:spPr>
           <a:xfrm>
             <a:off x="3805572" y="3810000"/>
-            <a:ext cx="1223412" cy="400110"/>
+            <a:ext cx="1215461" cy="400110"/>
           </a:xfrm>
           <a:prstGeom prst="rect">
             <a:avLst/>
@@ -4704,7 +4705,7 @@
           <a:lstStyle/>
           <a:p>
             <a:r>
-              <a:rPr lang="en-US" dirty="0" smtClean="0"/>
+              <a:rPr lang="en-US" smtClean="0"/>
               <a:t>May 2014</a:t>
             </a:r>
             <a:endParaRPr lang="en-US" dirty="0"/>
@@ -4714,7 +4715,7 @@
     </p:spTree>
     <p:extLst>
       <p:ext uri="{BB962C8B-B14F-4D97-AF65-F5344CB8AC3E}">
-        <p14:creationId xmlns:p14="http://schemas.microsoft.com/office/powerpoint/2010/main" val="4260470184"/>
+        <p14:creationId xmlns="" xmlns:p14="http://schemas.microsoft.com/office/powerpoint/2010/main" val="4260470184"/>
       </p:ext>
     </p:extLst>
   </p:cSld>
@@ -4724,7 +4725,7 @@
   <p:timing>
     <p:tnLst>
       <p:par>
-        <p:cTn xmlns:p14="http://schemas.microsoft.com/office/powerpoint/2010/main" id="1" dur="indefinite" restart="never" nodeType="tmRoot"/>
+        <p:cTn id="1" dur="indefinite" restart="never" nodeType="tmRoot"/>
       </p:par>
     </p:tnLst>
   </p:timing>
@@ -4885,7 +4886,7 @@
           <a:lstStyle/>
           <a:p>
             <a:r>
-              <a:rPr lang="en-US" dirty="0" smtClean="0"/>
+              <a:rPr lang="en-US" smtClean="0"/>
               <a:t>May 2014</a:t>
             </a:r>
             <a:endParaRPr lang="en-US" dirty="0"/>
@@ -5200,7 +5201,7 @@
     </p:spTree>
     <p:extLst>
       <p:ext uri="{BB962C8B-B14F-4D97-AF65-F5344CB8AC3E}">
-        <p14:creationId xmlns:p14="http://schemas.microsoft.com/office/powerpoint/2010/main" val="1036703678"/>
+        <p14:creationId xmlns="" xmlns:p14="http://schemas.microsoft.com/office/powerpoint/2010/main" val="1036703678"/>
       </p:ext>
     </p:extLst>
   </p:cSld>
@@ -5210,7 +5211,7 @@
   <p:timing>
     <p:tnLst>
       <p:par>
-        <p:cTn xmlns:p14="http://schemas.microsoft.com/office/powerpoint/2010/main" id="1" dur="indefinite" restart="never" nodeType="tmRoot"/>
+        <p:cTn id="1" dur="indefinite" restart="never" nodeType="tmRoot"/>
       </p:par>
     </p:tnLst>
   </p:timing>
@@ -5273,7 +5274,7 @@
           <a:lstStyle/>
           <a:p>
             <a:r>
-              <a:rPr lang="en-US" dirty="0" smtClean="0"/>
+              <a:rPr lang="en-US" smtClean="0"/>
               <a:t>May 2014</a:t>
             </a:r>
             <a:endParaRPr lang="en-US" dirty="0"/>
@@ -5632,7 +5633,7 @@
     </p:spTree>
     <p:extLst>
       <p:ext uri="{BB962C8B-B14F-4D97-AF65-F5344CB8AC3E}">
-        <p14:creationId xmlns:p14="http://schemas.microsoft.com/office/powerpoint/2010/main" val="1036703678"/>
+        <p14:creationId xmlns="" xmlns:p14="http://schemas.microsoft.com/office/powerpoint/2010/main" val="1036703678"/>
       </p:ext>
     </p:extLst>
   </p:cSld>
@@ -5642,7 +5643,7 @@
   <p:timing>
     <p:tnLst>
       <p:par>
-        <p:cTn xmlns:p14="http://schemas.microsoft.com/office/powerpoint/2010/main" id="1" dur="indefinite" restart="never" nodeType="tmRoot"/>
+        <p:cTn id="1" dur="indefinite" restart="never" nodeType="tmRoot"/>
       </p:par>
     </p:tnLst>
   </p:timing>
@@ -5711,7 +5712,7 @@
           <a:lstStyle/>
           <a:p>
             <a:r>
-              <a:rPr lang="en-US" dirty="0" smtClean="0"/>
+              <a:rPr lang="en-US" smtClean="0"/>
               <a:t>May 2014</a:t>
             </a:r>
             <a:endParaRPr lang="en-US" dirty="0"/>
@@ -5752,7 +5753,7 @@
     </p:spTree>
     <p:extLst>
       <p:ext uri="{BB962C8B-B14F-4D97-AF65-F5344CB8AC3E}">
-        <p14:creationId xmlns:p14="http://schemas.microsoft.com/office/powerpoint/2010/main" val="4240243667"/>
+        <p14:creationId xmlns="" xmlns:p14="http://schemas.microsoft.com/office/powerpoint/2010/main" val="4240243667"/>
       </p:ext>
     </p:extLst>
   </p:cSld>
@@ -5762,7 +5763,7 @@
   <p:timing>
     <p:tnLst>
       <p:par>
-        <p:cTn xmlns:p14="http://schemas.microsoft.com/office/powerpoint/2010/main" id="1" dur="indefinite" restart="never" nodeType="tmRoot"/>
+        <p:cTn id="1" dur="indefinite" restart="never" nodeType="tmRoot"/>
       </p:par>
     </p:tnLst>
   </p:timing>
@@ -5879,7 +5880,7 @@
           <a:lstStyle/>
           <a:p>
             <a:r>
-              <a:rPr lang="en-US" dirty="0" smtClean="0"/>
+              <a:rPr lang="en-US" smtClean="0"/>
               <a:t>May 2014</a:t>
             </a:r>
             <a:endParaRPr lang="en-US" dirty="0"/>
@@ -5913,7 +5914,7 @@
     </p:spTree>
     <p:extLst>
       <p:ext uri="{BB962C8B-B14F-4D97-AF65-F5344CB8AC3E}">
-        <p14:creationId xmlns:p14="http://schemas.microsoft.com/office/powerpoint/2010/main" val="1036703678"/>
+        <p14:creationId xmlns="" xmlns:p14="http://schemas.microsoft.com/office/powerpoint/2010/main" val="1036703678"/>
       </p:ext>
     </p:extLst>
   </p:cSld>
@@ -5923,7 +5924,7 @@
   <p:timing>
     <p:tnLst>
       <p:par>
-        <p:cTn xmlns:p14="http://schemas.microsoft.com/office/powerpoint/2010/main" id="1" dur="indefinite" restart="never" nodeType="tmRoot"/>
+        <p:cTn id="1" dur="indefinite" restart="never" nodeType="tmRoot"/>
       </p:par>
     </p:tnLst>
   </p:timing>
@@ -6114,7 +6115,7 @@
           <a:lstStyle/>
           <a:p>
             <a:r>
-              <a:rPr lang="en-US" dirty="0" smtClean="0"/>
+              <a:rPr lang="en-US" smtClean="0"/>
               <a:t>May 2014</a:t>
             </a:r>
             <a:endParaRPr lang="en-US" dirty="0"/>
@@ -6148,7 +6149,7 @@
     </p:spTree>
     <p:extLst>
       <p:ext uri="{BB962C8B-B14F-4D97-AF65-F5344CB8AC3E}">
-        <p14:creationId xmlns:p14="http://schemas.microsoft.com/office/powerpoint/2010/main" val="1036703678"/>
+        <p14:creationId xmlns="" xmlns:p14="http://schemas.microsoft.com/office/powerpoint/2010/main" val="1036703678"/>
       </p:ext>
     </p:extLst>
   </p:cSld>
@@ -6158,7 +6159,7 @@
   <p:timing>
     <p:tnLst>
       <p:par>
-        <p:cTn xmlns:p14="http://schemas.microsoft.com/office/powerpoint/2010/main" id="1" dur="indefinite" restart="never" nodeType="tmRoot"/>
+        <p:cTn id="1" dur="indefinite" restart="never" nodeType="tmRoot"/>
       </p:par>
     </p:tnLst>
   </p:timing>
@@ -6265,7 +6266,7 @@
           <a:lstStyle/>
           <a:p>
             <a:r>
-              <a:rPr lang="en-US" dirty="0" smtClean="0"/>
+              <a:rPr lang="en-US" smtClean="0"/>
               <a:t>May 2014</a:t>
             </a:r>
             <a:endParaRPr lang="en-US" dirty="0"/>
@@ -6805,7 +6806,7 @@
     </p:spTree>
     <p:extLst>
       <p:ext uri="{BB962C8B-B14F-4D97-AF65-F5344CB8AC3E}">
-        <p14:creationId xmlns:p14="http://schemas.microsoft.com/office/powerpoint/2010/main" val="1036703678"/>
+        <p14:creationId xmlns="" xmlns:p14="http://schemas.microsoft.com/office/powerpoint/2010/main" val="1036703678"/>
       </p:ext>
     </p:extLst>
   </p:cSld>
@@ -6815,7 +6816,7 @@
   <p:timing>
     <p:tnLst>
       <p:par>
-        <p:cTn xmlns:p14="http://schemas.microsoft.com/office/powerpoint/2010/main" id="1" dur="indefinite" restart="never" nodeType="tmRoot"/>
+        <p:cTn id="1" dur="indefinite" restart="never" nodeType="tmRoot"/>
       </p:par>
     </p:tnLst>
   </p:timing>
@@ -6945,7 +6946,7 @@
           <a:lstStyle/>
           <a:p>
             <a:r>
-              <a:rPr lang="en-US" dirty="0" smtClean="0"/>
+              <a:rPr lang="en-US" smtClean="0"/>
               <a:t>May 2014</a:t>
             </a:r>
             <a:endParaRPr lang="en-US" dirty="0"/>
@@ -7395,7 +7396,7 @@
     </p:spTree>
     <p:extLst>
       <p:ext uri="{BB962C8B-B14F-4D97-AF65-F5344CB8AC3E}">
-        <p14:creationId xmlns:p14="http://schemas.microsoft.com/office/powerpoint/2010/main" val="1036703678"/>
+        <p14:creationId xmlns="" xmlns:p14="http://schemas.microsoft.com/office/powerpoint/2010/main" val="1036703678"/>
       </p:ext>
     </p:extLst>
   </p:cSld>
@@ -7405,7 +7406,7 @@
   <p:timing>
     <p:tnLst>
       <p:par>
-        <p:cTn xmlns:p14="http://schemas.microsoft.com/office/powerpoint/2010/main" id="1" dur="indefinite" restart="never" nodeType="tmRoot"/>
+        <p:cTn id="1" dur="indefinite" restart="never" nodeType="tmRoot"/>
       </p:par>
     </p:tnLst>
   </p:timing>
@@ -7474,7 +7475,7 @@
           <a:lstStyle/>
           <a:p>
             <a:r>
-              <a:rPr lang="en-US" dirty="0" smtClean="0"/>
+              <a:rPr lang="en-US" smtClean="0"/>
               <a:t>May 2014</a:t>
             </a:r>
             <a:endParaRPr lang="en-US" dirty="0"/>
@@ -7515,7 +7516,7 @@
     </p:spTree>
     <p:extLst>
       <p:ext uri="{BB962C8B-B14F-4D97-AF65-F5344CB8AC3E}">
-        <p14:creationId xmlns:p14="http://schemas.microsoft.com/office/powerpoint/2010/main" val="4240243667"/>
+        <p14:creationId xmlns="" xmlns:p14="http://schemas.microsoft.com/office/powerpoint/2010/main" val="4240243667"/>
       </p:ext>
     </p:extLst>
   </p:cSld>
@@ -7525,7 +7526,7 @@
   <p:timing>
     <p:tnLst>
       <p:par>
-        <p:cTn xmlns:p14="http://schemas.microsoft.com/office/powerpoint/2010/main" id="1" dur="indefinite" restart="never" nodeType="tmRoot"/>
+        <p:cTn id="1" dur="indefinite" restart="never" nodeType="tmRoot"/>
       </p:par>
     </p:tnLst>
   </p:timing>
@@ -7683,7 +7684,7 @@
           <a:lstStyle/>
           <a:p>
             <a:r>
-              <a:rPr lang="en-US" dirty="0" smtClean="0"/>
+              <a:rPr lang="en-US" smtClean="0"/>
               <a:t>May 2014</a:t>
             </a:r>
             <a:endParaRPr lang="en-US" dirty="0"/>
@@ -8451,7 +8452,7 @@
     </p:spTree>
     <p:extLst>
       <p:ext uri="{BB962C8B-B14F-4D97-AF65-F5344CB8AC3E}">
-        <p14:creationId xmlns:p14="http://schemas.microsoft.com/office/powerpoint/2010/main" val="1036703678"/>
+        <p14:creationId xmlns="" xmlns:p14="http://schemas.microsoft.com/office/powerpoint/2010/main" val="1036703678"/>
       </p:ext>
     </p:extLst>
   </p:cSld>
@@ -8461,7 +8462,7 @@
   <p:timing>
     <p:tnLst>
       <p:par>
-        <p:cTn xmlns:p14="http://schemas.microsoft.com/office/powerpoint/2010/main" id="1" dur="indefinite" restart="never" nodeType="tmRoot"/>
+        <p:cTn id="1" dur="indefinite" restart="never" nodeType="tmRoot"/>
       </p:par>
     </p:tnLst>
   </p:timing>
@@ -8626,7 +8627,7 @@
           <a:lstStyle/>
           <a:p>
             <a:r>
-              <a:rPr lang="en-US" dirty="0" smtClean="0"/>
+              <a:rPr lang="en-US" smtClean="0"/>
               <a:t>May 2014</a:t>
             </a:r>
             <a:endParaRPr lang="en-US" dirty="0"/>
@@ -8891,7 +8892,7 @@
     </p:spTree>
     <p:extLst>
       <p:ext uri="{BB962C8B-B14F-4D97-AF65-F5344CB8AC3E}">
-        <p14:creationId xmlns:p14="http://schemas.microsoft.com/office/powerpoint/2010/main" val="1036703678"/>
+        <p14:creationId xmlns="" xmlns:p14="http://schemas.microsoft.com/office/powerpoint/2010/main" val="1036703678"/>
       </p:ext>
     </p:extLst>
   </p:cSld>
@@ -8901,7 +8902,7 @@
   <p:timing>
     <p:tnLst>
       <p:par>
-        <p:cTn xmlns:p14="http://schemas.microsoft.com/office/powerpoint/2010/main" id="1" dur="indefinite" restart="never" nodeType="tmRoot"/>
+        <p:cTn id="1" dur="indefinite" restart="never" nodeType="tmRoot"/>
       </p:par>
     </p:tnLst>
   </p:timing>
@@ -9039,7 +9040,7 @@
           <a:lstStyle/>
           <a:p>
             <a:r>
-              <a:rPr lang="en-US" dirty="0" smtClean="0"/>
+              <a:rPr lang="en-US" smtClean="0"/>
               <a:t>May 2014</a:t>
             </a:r>
             <a:endParaRPr lang="en-US" dirty="0"/>
@@ -9073,7 +9074,7 @@
     </p:spTree>
     <p:extLst>
       <p:ext uri="{BB962C8B-B14F-4D97-AF65-F5344CB8AC3E}">
-        <p14:creationId xmlns:p14="http://schemas.microsoft.com/office/powerpoint/2010/main" val="2473960435"/>
+        <p14:creationId xmlns="" xmlns:p14="http://schemas.microsoft.com/office/powerpoint/2010/main" val="2473960435"/>
       </p:ext>
     </p:extLst>
   </p:cSld>
@@ -9083,7 +9084,7 @@
   <p:timing>
     <p:tnLst>
       <p:par>
-        <p:cTn xmlns:p14="http://schemas.microsoft.com/office/powerpoint/2010/main" id="1" dur="indefinite" restart="never" nodeType="tmRoot"/>
+        <p:cTn id="1" dur="indefinite" restart="never" nodeType="tmRoot"/>
       </p:par>
     </p:tnLst>
   </p:timing>
@@ -9257,7 +9258,7 @@
           <a:lstStyle/>
           <a:p>
             <a:r>
-              <a:rPr lang="en-US" dirty="0" smtClean="0"/>
+              <a:rPr lang="en-US" smtClean="0"/>
               <a:t>May 2014</a:t>
             </a:r>
             <a:endParaRPr lang="en-US" dirty="0"/>
@@ -10330,7 +10331,7 @@
     </p:spTree>
     <p:extLst>
       <p:ext uri="{BB962C8B-B14F-4D97-AF65-F5344CB8AC3E}">
-        <p14:creationId xmlns:p14="http://schemas.microsoft.com/office/powerpoint/2010/main" val="1036703678"/>
+        <p14:creationId xmlns="" xmlns:p14="http://schemas.microsoft.com/office/powerpoint/2010/main" val="1036703678"/>
       </p:ext>
     </p:extLst>
   </p:cSld>
@@ -10340,7 +10341,7 @@
   <p:timing>
     <p:tnLst>
       <p:par>
-        <p:cTn xmlns:p14="http://schemas.microsoft.com/office/powerpoint/2010/main" id="1" dur="indefinite" restart="never" nodeType="tmRoot"/>
+        <p:cTn id="1" dur="indefinite" restart="never" nodeType="tmRoot"/>
       </p:par>
     </p:tnLst>
   </p:timing>
@@ -10409,7 +10410,7 @@
           <a:lstStyle/>
           <a:p>
             <a:r>
-              <a:rPr lang="en-US" dirty="0" smtClean="0"/>
+              <a:rPr lang="en-US" smtClean="0"/>
               <a:t>May 2014</a:t>
             </a:r>
             <a:endParaRPr lang="en-US" dirty="0"/>
@@ -10464,7 +10465,7 @@
     </p:spTree>
     <p:extLst>
       <p:ext uri="{BB962C8B-B14F-4D97-AF65-F5344CB8AC3E}">
-        <p14:creationId xmlns:p14="http://schemas.microsoft.com/office/powerpoint/2010/main" val="4240243667"/>
+        <p14:creationId xmlns="" xmlns:p14="http://schemas.microsoft.com/office/powerpoint/2010/main" val="4240243667"/>
       </p:ext>
     </p:extLst>
   </p:cSld>
@@ -10474,7 +10475,7 @@
   <p:timing>
     <p:tnLst>
       <p:par>
-        <p:cTn xmlns:p14="http://schemas.microsoft.com/office/powerpoint/2010/main" id="1" dur="indefinite" restart="never" nodeType="tmRoot"/>
+        <p:cTn id="1" dur="indefinite" restart="never" nodeType="tmRoot"/>
       </p:par>
     </p:tnLst>
   </p:timing>
@@ -10549,15 +10550,15 @@
                   <a:schemeClr val="tx2"/>
                 </a:solidFill>
               </a:rPr>
-              <a:t>URDF is an xml-formatted file containing </a:t>
+              <a:t>URDF is an </a:t>
             </a:r>
             <a:r>
               <a:rPr lang="en-US" sz="3000" b="1" dirty="0" smtClean="0">
                 <a:solidFill>
-                  <a:schemeClr val="tx2"/>
+                  <a:schemeClr val="accent6"/>
                 </a:solidFill>
               </a:rPr>
-              <a:t>frames</a:t>
+              <a:t>XML</a:t>
             </a:r>
             <a:r>
               <a:rPr lang="en-US" sz="3000" dirty="0" smtClean="0">
@@ -10565,29 +10566,77 @@
                   <a:schemeClr val="tx2"/>
                 </a:solidFill>
               </a:rPr>
-              <a:t>, </a:t>
-            </a:r>
-            <a:r>
-              <a:rPr lang="en-US" sz="3000" b="1" dirty="0" smtClean="0">
+              <a:t>-formatted file containing:</a:t>
+            </a:r>
+          </a:p>
+          <a:p>
+            <a:pPr lvl="1"/>
+            <a:r>
+              <a:rPr lang="en-US" sz="2600" b="1" dirty="0" smtClean="0"/>
+              <a:t>Links</a:t>
+            </a:r>
+            <a:r>
+              <a:rPr lang="en-US" sz="2600" dirty="0" smtClean="0"/>
+              <a:t> : coordinate </a:t>
+            </a:r>
+            <a:r>
+              <a:rPr lang="en-US" sz="2600" dirty="0" smtClean="0">
                 <a:solidFill>
                   <a:schemeClr val="tx2"/>
                 </a:solidFill>
               </a:rPr>
-              <a:t>connections</a:t>
-            </a:r>
-            <a:r>
-              <a:rPr lang="en-US" sz="3000" dirty="0" smtClean="0">
+              <a:t>frames and associated geometry</a:t>
+            </a:r>
+          </a:p>
+          <a:p>
+            <a:pPr lvl="1"/>
+            <a:r>
+              <a:rPr lang="en-US" sz="2600" b="1" dirty="0" smtClean="0"/>
+              <a:t>Joints : </a:t>
+            </a:r>
+            <a:r>
+              <a:rPr lang="en-US" sz="2600" dirty="0" smtClean="0">
                 <a:solidFill>
                   <a:schemeClr val="tx2"/>
                 </a:solidFill>
               </a:rPr>
-              <a:t> between those frames, and a physical description of a system.</a:t>
-            </a:r>
-          </a:p>
-          <a:p>
+              <a:t>connections between links</a:t>
+            </a:r>
+          </a:p>
+          <a:p>
+            <a:pPr>
+              <a:tabLst>
+                <a:tab pos="7772400" algn="r"/>
+              </a:tabLst>
+            </a:pPr>
             <a:r>
               <a:rPr lang="en-US" sz="3000" dirty="0" smtClean="0"/>
-              <a:t>Used for description of everything, not just robots.</a:t>
+              <a:t>Similar to DH-parameters	</a:t>
+            </a:r>
+            <a:r>
+              <a:rPr lang="en-US" sz="2400" dirty="0" smtClean="0">
+                <a:solidFill>
+                  <a:schemeClr val="tx2">
+                    <a:lumMod val="60000"/>
+                    <a:lumOff val="40000"/>
+                  </a:schemeClr>
+                </a:solidFill>
+              </a:rPr>
+              <a:t>(but way less painful)</a:t>
+            </a:r>
+            <a:endParaRPr lang="en-US" sz="3000" dirty="0" smtClean="0">
+              <a:solidFill>
+                <a:schemeClr val="tx2">
+                  <a:lumMod val="60000"/>
+                  <a:lumOff val="40000"/>
+                </a:schemeClr>
+              </a:solidFill>
+            </a:endParaRPr>
+          </a:p>
+          <a:p>
+            <a:r>
+              <a:rPr lang="en-US" sz="3000" dirty="0" smtClean="0"/>
+              <a:t>Can describe entire workspace, not just robots</a:t>
             </a:r>
           </a:p>
         </p:txBody>
@@ -10608,7 +10657,7 @@
           <a:lstStyle/>
           <a:p>
             <a:r>
-              <a:rPr lang="en-US" dirty="0" smtClean="0"/>
+              <a:rPr lang="en-US" smtClean="0"/>
               <a:t>May 2014</a:t>
             </a:r>
             <a:endParaRPr lang="en-US" dirty="0"/>
@@ -10639,10 +10688,352 @@
           </a:p>
         </p:txBody>
       </p:sp>
+      <p:grpSp>
+        <p:nvGrpSpPr>
+          <p:cNvPr id="17" name="Group 16"/>
+          <p:cNvGrpSpPr/>
+          <p:nvPr/>
+        </p:nvGrpSpPr>
+        <p:grpSpPr>
+          <a:xfrm>
+            <a:off x="2819400" y="4038600"/>
+            <a:ext cx="3733800" cy="2304117"/>
+            <a:chOff x="3657600" y="3516868"/>
+            <a:chExt cx="3733800" cy="2304117"/>
+          </a:xfrm>
+        </p:grpSpPr>
+        <p:pic>
+          <p:nvPicPr>
+            <p:cNvPr id="8" name="Picture 63" descr="roomba"/>
+            <p:cNvPicPr>
+              <a:picLocks noChangeAspect="1" noChangeArrowheads="1"/>
+            </p:cNvPicPr>
+            <p:nvPr/>
+          </p:nvPicPr>
+          <p:blipFill>
+            <a:blip r:embed="rId2" cstate="print">
+              <a:duotone>
+                <a:prstClr val="black"/>
+                <a:schemeClr val="tx2">
+                  <a:tint val="45000"/>
+                  <a:satMod val="400000"/>
+                </a:schemeClr>
+              </a:duotone>
+            </a:blip>
+            <a:srcRect/>
+            <a:stretch>
+              <a:fillRect/>
+            </a:stretch>
+          </p:blipFill>
+          <p:spPr bwMode="auto">
+            <a:xfrm>
+              <a:off x="3657600" y="3962400"/>
+              <a:ext cx="1905000" cy="1858585"/>
+            </a:xfrm>
+            <a:prstGeom prst="rect">
+              <a:avLst/>
+            </a:prstGeom>
+            <a:noFill/>
+            <a:ln w="9525">
+              <a:noFill/>
+              <a:miter lim="800000"/>
+              <a:headEnd/>
+              <a:tailEnd/>
+            </a:ln>
+          </p:spPr>
+        </p:pic>
+        <p:sp>
+          <p:nvSpPr>
+            <p:cNvPr id="10" name="Right Arrow 9"/>
+            <p:cNvSpPr/>
+            <p:nvPr/>
+          </p:nvSpPr>
+          <p:spPr>
+            <a:xfrm rot="6025462">
+              <a:off x="3987357" y="3996510"/>
+              <a:ext cx="533400" cy="185058"/>
+            </a:xfrm>
+            <a:prstGeom prst="rightArrow">
+              <a:avLst/>
+            </a:prstGeom>
+          </p:spPr>
+          <p:style>
+            <a:lnRef idx="2">
+              <a:schemeClr val="accent1">
+                <a:shade val="50000"/>
+              </a:schemeClr>
+            </a:lnRef>
+            <a:fillRef idx="1">
+              <a:schemeClr val="accent1"/>
+            </a:fillRef>
+            <a:effectRef idx="0">
+              <a:schemeClr val="accent1"/>
+            </a:effectRef>
+            <a:fontRef idx="minor">
+              <a:schemeClr val="lt1"/>
+            </a:fontRef>
+          </p:style>
+          <p:txBody>
+            <a:bodyPr rtlCol="0" anchor="ctr"/>
+            <a:lstStyle/>
+            <a:p>
+              <a:pPr algn="ctr"/>
+              <a:endParaRPr lang="en-US"/>
+            </a:p>
+          </p:txBody>
+        </p:sp>
+        <p:sp>
+          <p:nvSpPr>
+            <p:cNvPr id="11" name="TextBox 10"/>
+            <p:cNvSpPr txBox="1"/>
+            <p:nvPr/>
+          </p:nvSpPr>
+          <p:spPr>
+            <a:xfrm>
+              <a:off x="4038600" y="3516868"/>
+              <a:ext cx="609600" cy="369332"/>
+            </a:xfrm>
+            <a:prstGeom prst="rect">
+              <a:avLst/>
+            </a:prstGeom>
+            <a:noFill/>
+          </p:spPr>
+          <p:txBody>
+            <a:bodyPr wrap="square" rtlCol="0">
+              <a:spAutoFit/>
+            </a:bodyPr>
+            <a:lstStyle/>
+            <a:p>
+              <a:r>
+                <a:rPr lang="en-US" dirty="0" smtClean="0"/>
+                <a:t>links</a:t>
+              </a:r>
+              <a:endParaRPr lang="en-US" dirty="0"/>
+            </a:p>
+          </p:txBody>
+        </p:sp>
+        <p:sp>
+          <p:nvSpPr>
+            <p:cNvPr id="12" name="Right Arrow 11"/>
+            <p:cNvSpPr/>
+            <p:nvPr/>
+          </p:nvSpPr>
+          <p:spPr>
+            <a:xfrm rot="16200000">
+              <a:off x="4320540" y="4594860"/>
+              <a:ext cx="533400" cy="182880"/>
+            </a:xfrm>
+            <a:prstGeom prst="rightArrow">
+              <a:avLst/>
+            </a:prstGeom>
+          </p:spPr>
+          <p:style>
+            <a:lnRef idx="2">
+              <a:schemeClr val="accent3">
+                <a:shade val="50000"/>
+              </a:schemeClr>
+            </a:lnRef>
+            <a:fillRef idx="1">
+              <a:schemeClr val="accent3"/>
+            </a:fillRef>
+            <a:effectRef idx="0">
+              <a:schemeClr val="accent3"/>
+            </a:effectRef>
+            <a:fontRef idx="minor">
+              <a:schemeClr val="lt1"/>
+            </a:fontRef>
+          </p:style>
+          <p:txBody>
+            <a:bodyPr rtlCol="0" anchor="ctr"/>
+            <a:lstStyle/>
+            <a:p>
+              <a:pPr algn="ctr"/>
+              <a:endParaRPr lang="en-US"/>
+            </a:p>
+          </p:txBody>
+        </p:sp>
+        <p:sp>
+          <p:nvSpPr>
+            <p:cNvPr id="13" name="Right Arrow 12"/>
+            <p:cNvSpPr/>
+            <p:nvPr/>
+          </p:nvSpPr>
+          <p:spPr>
+            <a:xfrm rot="3031715">
+              <a:off x="4470066" y="3905968"/>
+              <a:ext cx="533400" cy="185058"/>
+            </a:xfrm>
+            <a:prstGeom prst="rightArrow">
+              <a:avLst/>
+            </a:prstGeom>
+          </p:spPr>
+          <p:style>
+            <a:lnRef idx="2">
+              <a:schemeClr val="accent1">
+                <a:shade val="50000"/>
+              </a:schemeClr>
+            </a:lnRef>
+            <a:fillRef idx="1">
+              <a:schemeClr val="accent1"/>
+            </a:fillRef>
+            <a:effectRef idx="0">
+              <a:schemeClr val="accent1"/>
+            </a:effectRef>
+            <a:fontRef idx="minor">
+              <a:schemeClr val="lt1"/>
+            </a:fontRef>
+          </p:style>
+          <p:txBody>
+            <a:bodyPr rtlCol="0" anchor="ctr"/>
+            <a:lstStyle/>
+            <a:p>
+              <a:pPr algn="ctr"/>
+              <a:endParaRPr lang="en-US"/>
+            </a:p>
+          </p:txBody>
+        </p:sp>
+        <p:sp>
+          <p:nvSpPr>
+            <p:cNvPr id="14" name="TextBox 13"/>
+            <p:cNvSpPr txBox="1"/>
+            <p:nvPr/>
+          </p:nvSpPr>
+          <p:spPr>
+            <a:xfrm>
+              <a:off x="4343400" y="4876800"/>
+              <a:ext cx="609600" cy="369332"/>
+            </a:xfrm>
+            <a:prstGeom prst="rect">
+              <a:avLst/>
+            </a:prstGeom>
+            <a:noFill/>
+          </p:spPr>
+          <p:txBody>
+            <a:bodyPr wrap="square" rtlCol="0">
+              <a:spAutoFit/>
+            </a:bodyPr>
+            <a:lstStyle/>
+            <a:p>
+              <a:r>
+                <a:rPr lang="en-US" dirty="0" smtClean="0"/>
+                <a:t>joint</a:t>
+              </a:r>
+              <a:endParaRPr lang="en-US" dirty="0"/>
+            </a:p>
+          </p:txBody>
+        </p:sp>
+        <p:pic>
+          <p:nvPicPr>
+            <p:cNvPr id="1026" name="Picture 2" descr="C:\Users\jzoss\AppData\Local\Microsoft\Windows\Temporary Internet Files\Content.IE5\I8GX6NMS\MC900030371[1].wmf"/>
+            <p:cNvPicPr>
+              <a:picLocks noChangeAspect="1" noChangeArrowheads="1"/>
+            </p:cNvPicPr>
+            <p:nvPr/>
+          </p:nvPicPr>
+          <p:blipFill>
+            <a:blip r:embed="rId3" cstate="print">
+              <a:grayscl/>
+              <a:lum bright="37000" contrast="-33000"/>
+            </a:blip>
+            <a:srcRect/>
+            <a:stretch>
+              <a:fillRect/>
+            </a:stretch>
+          </p:blipFill>
+          <p:spPr bwMode="auto">
+            <a:xfrm>
+              <a:off x="4953000" y="4724400"/>
+              <a:ext cx="1313858" cy="1047750"/>
+            </a:xfrm>
+            <a:prstGeom prst="rect">
+              <a:avLst/>
+            </a:prstGeom>
+            <a:noFill/>
+          </p:spPr>
+        </p:pic>
+        <p:sp>
+          <p:nvSpPr>
+            <p:cNvPr id="15" name="Right Arrow 14"/>
+            <p:cNvSpPr/>
+            <p:nvPr/>
+          </p:nvSpPr>
+          <p:spPr>
+            <a:xfrm rot="9193877">
+              <a:off x="6032893" y="4682202"/>
+              <a:ext cx="533400" cy="185058"/>
+            </a:xfrm>
+            <a:prstGeom prst="rightArrow">
+              <a:avLst/>
+            </a:prstGeom>
+          </p:spPr>
+          <p:style>
+            <a:lnRef idx="2">
+              <a:schemeClr val="accent1">
+                <a:shade val="50000"/>
+              </a:schemeClr>
+            </a:lnRef>
+            <a:fillRef idx="1">
+              <a:schemeClr val="accent1"/>
+            </a:fillRef>
+            <a:effectRef idx="0">
+              <a:schemeClr val="accent1"/>
+            </a:effectRef>
+            <a:fontRef idx="minor">
+              <a:schemeClr val="lt1"/>
+            </a:fontRef>
+          </p:style>
+          <p:txBody>
+            <a:bodyPr rtlCol="0" anchor="ctr"/>
+            <a:lstStyle/>
+            <a:p>
+              <a:pPr algn="ctr"/>
+              <a:endParaRPr lang="en-US"/>
+            </a:p>
+          </p:txBody>
+        </p:sp>
+        <p:sp>
+          <p:nvSpPr>
+            <p:cNvPr id="16" name="TextBox 15"/>
+            <p:cNvSpPr txBox="1"/>
+            <p:nvPr/>
+          </p:nvSpPr>
+          <p:spPr>
+            <a:xfrm>
+              <a:off x="6400800" y="4343400"/>
+              <a:ext cx="990600" cy="646331"/>
+            </a:xfrm>
+            <a:prstGeom prst="rect">
+              <a:avLst/>
+            </a:prstGeom>
+            <a:noFill/>
+          </p:spPr>
+          <p:txBody>
+            <a:bodyPr wrap="square" rtlCol="0">
+              <a:spAutoFit/>
+            </a:bodyPr>
+            <a:lstStyle/>
+            <a:p>
+              <a:pPr algn="ctr"/>
+              <a:r>
+                <a:rPr lang="en-US" dirty="0" smtClean="0"/>
+                <a:t>also</a:t>
+              </a:r>
+            </a:p>
+            <a:p>
+              <a:pPr algn="ctr"/>
+              <a:r>
+                <a:rPr lang="en-US" dirty="0" smtClean="0"/>
+                <a:t> a “link”</a:t>
+              </a:r>
+              <a:endParaRPr lang="en-US" dirty="0"/>
+            </a:p>
+          </p:txBody>
+        </p:sp>
+      </p:grpSp>
     </p:spTree>
     <p:extLst>
       <p:ext uri="{BB962C8B-B14F-4D97-AF65-F5344CB8AC3E}">
-        <p14:creationId xmlns:p14="http://schemas.microsoft.com/office/powerpoint/2010/main" val="1036703678"/>
+        <p14:creationId xmlns="" xmlns:p14="http://schemas.microsoft.com/office/powerpoint/2010/main" val="1036703678"/>
       </p:ext>
     </p:extLst>
   </p:cSld>
@@ -10652,7 +11043,7 @@
   <p:timing>
     <p:tnLst>
       <p:par>
-        <p:cTn xmlns:p14="http://schemas.microsoft.com/office/powerpoint/2010/main" id="1" dur="indefinite" restart="never" nodeType="tmRoot"/>
+        <p:cTn id="1" dur="indefinite" restart="never" nodeType="tmRoot"/>
       </p:par>
     </p:tnLst>
   </p:timing>
@@ -10721,31 +11112,114 @@
           </a:bodyPr>
           <a:lstStyle/>
           <a:p>
-            <a:pPr marL="0" indent="0" defTabSz="457200"/>
+            <a:pPr defTabSz="457200"/>
             <a:r>
               <a:rPr lang="en-US" sz="3100" dirty="0" smtClean="0"/>
-              <a:t>Each link becomes a frame</a:t>
-            </a:r>
-          </a:p>
-          <a:p>
-            <a:pPr marL="0" indent="0" defTabSz="457200"/>
+              <a:t>A </a:t>
+            </a:r>
+            <a:r>
+              <a:rPr lang="en-US" sz="3100" b="1" dirty="0" smtClean="0"/>
+              <a:t>Link</a:t>
+            </a:r>
             <a:r>
               <a:rPr lang="en-US" sz="3100" dirty="0" smtClean="0"/>
-              <a:t>Can contain physical information</a:t>
-            </a:r>
-          </a:p>
-          <a:p>
-            <a:pPr marL="0" indent="0" defTabSz="457200"/>
+              <a:t> describes a </a:t>
+            </a:r>
+            <a:r>
+              <a:rPr lang="en-US" sz="3100" dirty="0" smtClean="0">
+                <a:solidFill>
+                  <a:schemeClr val="accent2"/>
+                </a:solidFill>
+              </a:rPr>
+              <a:t>physical</a:t>
+            </a:r>
             <a:r>
               <a:rPr lang="en-US" sz="3100" dirty="0" smtClean="0"/>
-              <a:t>Frame information is stored in xyz, roll-pitch-yaw format</a:t>
-            </a:r>
-          </a:p>
-          <a:p>
-            <a:pPr marL="0" lvl="1" indent="0" defTabSz="457200"/>
+              <a:t> or </a:t>
+            </a:r>
+            <a:r>
+              <a:rPr lang="en-US" sz="3100" dirty="0" smtClean="0">
+                <a:solidFill>
+                  <a:schemeClr val="accent2"/>
+                </a:solidFill>
+              </a:rPr>
+              <a:t>virtual</a:t>
+            </a:r>
             <a:r>
               <a:rPr lang="en-US" sz="3100" dirty="0" smtClean="0"/>
-              <a:t>Units of meters and radians</a:t>
+              <a:t> object</a:t>
+            </a:r>
+          </a:p>
+          <a:p>
+            <a:pPr lvl="1" defTabSz="457200">
+              <a:tabLst>
+                <a:tab pos="1600200" algn="l"/>
+              </a:tabLst>
+            </a:pPr>
+            <a:r>
+              <a:rPr lang="en-US" sz="2700" dirty="0" smtClean="0"/>
+              <a:t>Physical	: robot link, </a:t>
+            </a:r>
+            <a:r>
+              <a:rPr lang="en-US" sz="2700" dirty="0" err="1" smtClean="0"/>
+              <a:t>workpiece</a:t>
+            </a:r>
+            <a:r>
+              <a:rPr lang="en-US" sz="2700" dirty="0" smtClean="0"/>
+              <a:t>, end-</a:t>
+            </a:r>
+            <a:r>
+              <a:rPr lang="en-US" sz="2700" dirty="0" err="1" smtClean="0"/>
+              <a:t>effector</a:t>
+            </a:r>
+            <a:r>
+              <a:rPr lang="en-US" sz="2700" dirty="0" smtClean="0"/>
+              <a:t>, ...</a:t>
+            </a:r>
+          </a:p>
+          <a:p>
+            <a:pPr lvl="1" defTabSz="457200">
+              <a:tabLst>
+                <a:tab pos="1600200" algn="l"/>
+              </a:tabLst>
+            </a:pPr>
+            <a:r>
+              <a:rPr lang="en-US" sz="2700" dirty="0" smtClean="0"/>
+              <a:t>Virtual	: TCP, robot base frame, ...</a:t>
+            </a:r>
+          </a:p>
+          <a:p>
+            <a:pPr defTabSz="457200"/>
+            <a:r>
+              <a:rPr lang="en-US" sz="3100" dirty="0" smtClean="0"/>
+              <a:t>Each link becomes a </a:t>
+            </a:r>
+            <a:r>
+              <a:rPr lang="en-US" sz="3100" dirty="0" smtClean="0">
+                <a:solidFill>
+                  <a:schemeClr val="accent2"/>
+                </a:solidFill>
+              </a:rPr>
+              <a:t>TF frame</a:t>
+            </a:r>
+          </a:p>
+          <a:p>
+            <a:pPr defTabSz="457200"/>
+            <a:r>
+              <a:rPr lang="en-US" sz="3100" dirty="0" smtClean="0"/>
+              <a:t>Can contain visual/collision </a:t>
+            </a:r>
+            <a:r>
+              <a:rPr lang="en-US" sz="3100" dirty="0" smtClean="0">
+                <a:solidFill>
+                  <a:schemeClr val="accent2"/>
+                </a:solidFill>
+              </a:rPr>
+              <a:t>geometry</a:t>
+            </a:r>
+            <a:r>
+              <a:rPr lang="en-US" sz="3100" dirty="0" smtClean="0"/>
+              <a:t> [optional]</a:t>
             </a:r>
           </a:p>
           <a:p>
@@ -10759,25 +11233,11 @@
               <a:buNone/>
             </a:pPr>
             <a:r>
-              <a:rPr lang="en-US" sz="1900" dirty="0" smtClean="0">
-                <a:latin typeface="Courier New" pitchFamily="49" charset="0"/>
-                <a:cs typeface="Courier New" pitchFamily="49" charset="0"/>
-              </a:rPr>
-              <a:t>&lt;link name="</a:t>
-            </a:r>
-            <a:r>
-              <a:rPr lang="en-US" sz="1900" dirty="0" err="1" smtClean="0">
-                <a:latin typeface="Courier New" pitchFamily="49" charset="0"/>
-                <a:cs typeface="Courier New" pitchFamily="49" charset="0"/>
-              </a:rPr>
-              <a:t>shoulder_link</a:t>
-            </a:r>
-            <a:r>
-              <a:rPr lang="en-US" sz="1900" dirty="0" smtClean="0">
-                <a:latin typeface="Courier New" pitchFamily="49" charset="0"/>
-                <a:cs typeface="Courier New" pitchFamily="49" charset="0"/>
-              </a:rPr>
-              <a:t>“&gt;</a:t>
+              <a:rPr lang="en-US" sz="1600" dirty="0" smtClean="0">
+                <a:latin typeface="Courier New" pitchFamily="49" charset="0"/>
+                <a:cs typeface="Courier New" pitchFamily="49" charset="0"/>
+              </a:rPr>
+              <a:t>&lt;link name=“link_4“&gt;</a:t>
             </a:r>
           </a:p>
           <a:p>
@@ -10785,178 +11245,178 @@
               <a:buNone/>
             </a:pPr>
             <a:r>
-              <a:rPr lang="en-US" sz="1900" dirty="0" smtClean="0">
+              <a:rPr lang="en-US" sz="1600" dirty="0" smtClean="0">
                 <a:latin typeface="Courier New" pitchFamily="49" charset="0"/>
                 <a:cs typeface="Courier New" pitchFamily="49" charset="0"/>
               </a:rPr>
               <a:t>	&lt;visual&gt;</a:t>
             </a:r>
             <a:br>
-              <a:rPr lang="en-US" sz="1900" dirty="0" smtClean="0">
+              <a:rPr lang="en-US" sz="1600" dirty="0" smtClean="0">
                 <a:latin typeface="Courier New" pitchFamily="49" charset="0"/>
                 <a:cs typeface="Courier New" pitchFamily="49" charset="0"/>
               </a:rPr>
             </a:br>
             <a:r>
-              <a:rPr lang="en-US" sz="1900" dirty="0" smtClean="0">
+              <a:rPr lang="en-US" sz="1600" dirty="0" smtClean="0">
                 <a:latin typeface="Courier New" pitchFamily="49" charset="0"/>
                 <a:cs typeface="Courier New" pitchFamily="49" charset="0"/>
               </a:rPr>
               <a:t>		&lt;geometry&gt;</a:t>
             </a:r>
             <a:br>
-              <a:rPr lang="en-US" sz="1900" dirty="0" smtClean="0">
+              <a:rPr lang="en-US" sz="1600" dirty="0" smtClean="0">
                 <a:latin typeface="Courier New" pitchFamily="49" charset="0"/>
                 <a:cs typeface="Courier New" pitchFamily="49" charset="0"/>
               </a:rPr>
             </a:br>
             <a:r>
-              <a:rPr lang="en-US" sz="1900" dirty="0" smtClean="0">
-                <a:latin typeface="Courier New" pitchFamily="49" charset="0"/>
-                <a:cs typeface="Courier New" pitchFamily="49" charset="0"/>
-              </a:rPr>
-              <a:t>			&lt;cylinder length="0.1" radius="0.1"/&gt;</a:t>
+              <a:rPr lang="en-US" sz="1600" dirty="0" smtClean="0">
+                <a:latin typeface="Courier New" pitchFamily="49" charset="0"/>
+                <a:cs typeface="Courier New" pitchFamily="49" charset="0"/>
+              </a:rPr>
+              <a:t>			&lt;mesh filename=“link_4.stl"/&gt;</a:t>
             </a:r>
             <a:br>
-              <a:rPr lang="en-US" sz="1900" dirty="0" smtClean="0">
+              <a:rPr lang="en-US" sz="1600" dirty="0" smtClean="0">
                 <a:latin typeface="Courier New" pitchFamily="49" charset="0"/>
                 <a:cs typeface="Courier New" pitchFamily="49" charset="0"/>
               </a:rPr>
             </a:br>
             <a:r>
-              <a:rPr lang="en-US" sz="1900" dirty="0" smtClean="0">
+              <a:rPr lang="en-US" sz="1600" dirty="0" smtClean="0">
                 <a:latin typeface="Courier New" pitchFamily="49" charset="0"/>
                 <a:cs typeface="Courier New" pitchFamily="49" charset="0"/>
               </a:rPr>
               <a:t>		&lt;/geometry&gt;</a:t>
             </a:r>
             <a:br>
-              <a:rPr lang="en-US" sz="1900" dirty="0" smtClean="0">
+              <a:rPr lang="en-US" sz="1600" dirty="0" smtClean="0">
                 <a:latin typeface="Courier New" pitchFamily="49" charset="0"/>
                 <a:cs typeface="Courier New" pitchFamily="49" charset="0"/>
               </a:rPr>
             </a:br>
             <a:r>
-              <a:rPr lang="en-US" sz="1900" dirty="0" smtClean="0">
+              <a:rPr lang="en-US" sz="1600" dirty="0" smtClean="0">
+                <a:latin typeface="Courier New" pitchFamily="49" charset="0"/>
+                <a:cs typeface="Courier New" pitchFamily="49" charset="0"/>
+              </a:rPr>
+              <a:t>		&lt;origin xyz="0 0 0" </a:t>
+            </a:r>
+            <a:r>
+              <a:rPr lang="en-US" sz="1600" dirty="0" err="1" smtClean="0">
+                <a:latin typeface="Courier New" pitchFamily="49" charset="0"/>
+                <a:cs typeface="Courier New" pitchFamily="49" charset="0"/>
+              </a:rPr>
+              <a:t>rpy</a:t>
+            </a:r>
+            <a:r>
+              <a:rPr lang="en-US" sz="1600" dirty="0" smtClean="0">
+                <a:latin typeface="Courier New" pitchFamily="49" charset="0"/>
+                <a:cs typeface="Courier New" pitchFamily="49" charset="0"/>
+              </a:rPr>
+              <a:t>="0 0 0" /&gt;</a:t>
+            </a:r>
+            <a:br>
+              <a:rPr lang="en-US" sz="1600" dirty="0" smtClean="0">
+                <a:latin typeface="Courier New" pitchFamily="49" charset="0"/>
+                <a:cs typeface="Courier New" pitchFamily="49" charset="0"/>
+              </a:rPr>
+            </a:br>
+            <a:r>
+              <a:rPr lang="en-US" sz="1600" dirty="0" smtClean="0">
+                <a:latin typeface="Courier New" pitchFamily="49" charset="0"/>
+                <a:cs typeface="Courier New" pitchFamily="49" charset="0"/>
+              </a:rPr>
+              <a:t>	&lt;/visual&gt;</a:t>
+            </a:r>
+            <a:br>
+              <a:rPr lang="en-US" sz="1600" dirty="0" smtClean="0">
+                <a:latin typeface="Courier New" pitchFamily="49" charset="0"/>
+                <a:cs typeface="Courier New" pitchFamily="49" charset="0"/>
+              </a:rPr>
+            </a:br>
+            <a:r>
+              <a:rPr lang="en-US" sz="1600" dirty="0" smtClean="0">
+                <a:latin typeface="Courier New" pitchFamily="49" charset="0"/>
+                <a:cs typeface="Courier New" pitchFamily="49" charset="0"/>
+              </a:rPr>
+              <a:t>	&lt;collision&gt;</a:t>
+            </a:r>
+            <a:br>
+              <a:rPr lang="en-US" sz="1600" dirty="0" smtClean="0">
+                <a:latin typeface="Courier New" pitchFamily="49" charset="0"/>
+                <a:cs typeface="Courier New" pitchFamily="49" charset="0"/>
+              </a:rPr>
+            </a:br>
+            <a:r>
+              <a:rPr lang="en-US" sz="1600" dirty="0" smtClean="0">
+                <a:latin typeface="Courier New" pitchFamily="49" charset="0"/>
+                <a:cs typeface="Courier New" pitchFamily="49" charset="0"/>
+              </a:rPr>
+              <a:t>		&lt;geometry&gt;</a:t>
+            </a:r>
+            <a:br>
+              <a:rPr lang="en-US" sz="1600" dirty="0" smtClean="0">
+                <a:latin typeface="Courier New" pitchFamily="49" charset="0"/>
+                <a:cs typeface="Courier New" pitchFamily="49" charset="0"/>
+              </a:rPr>
+            </a:br>
+            <a:r>
+              <a:rPr lang="en-US" sz="1600" dirty="0" smtClean="0">
+                <a:latin typeface="Courier New" pitchFamily="49" charset="0"/>
+                <a:cs typeface="Courier New" pitchFamily="49" charset="0"/>
+              </a:rPr>
+              <a:t>			&lt;cylinder length="0.5" radius="0.1"/&gt;</a:t>
+            </a:r>
+            <a:br>
+              <a:rPr lang="en-US" sz="1600" dirty="0" smtClean="0">
+                <a:latin typeface="Courier New" pitchFamily="49" charset="0"/>
+                <a:cs typeface="Courier New" pitchFamily="49" charset="0"/>
+              </a:rPr>
+            </a:br>
+            <a:r>
+              <a:rPr lang="en-US" sz="1600" dirty="0" smtClean="0">
+                <a:latin typeface="Courier New" pitchFamily="49" charset="0"/>
+                <a:cs typeface="Courier New" pitchFamily="49" charset="0"/>
+              </a:rPr>
+              <a:t>		&lt;/geometry&gt;</a:t>
+            </a:r>
+            <a:br>
+              <a:rPr lang="en-US" sz="1600" dirty="0" smtClean="0">
+                <a:latin typeface="Courier New" pitchFamily="49" charset="0"/>
+                <a:cs typeface="Courier New" pitchFamily="49" charset="0"/>
+              </a:rPr>
+            </a:br>
+            <a:r>
+              <a:rPr lang="en-US" sz="1600" dirty="0" smtClean="0">
                 <a:latin typeface="Courier New" pitchFamily="49" charset="0"/>
                 <a:cs typeface="Courier New" pitchFamily="49" charset="0"/>
               </a:rPr>
               <a:t>		&lt;origin xyz="0 0 -0.05" </a:t>
             </a:r>
             <a:r>
-              <a:rPr lang="en-US" sz="1900" dirty="0" err="1" smtClean="0">
+              <a:rPr lang="en-US" sz="1600" dirty="0" err="1" smtClean="0">
                 <a:latin typeface="Courier New" pitchFamily="49" charset="0"/>
                 <a:cs typeface="Courier New" pitchFamily="49" charset="0"/>
               </a:rPr>
               <a:t>rpy</a:t>
             </a:r>
             <a:r>
-              <a:rPr lang="en-US" sz="1900" dirty="0" smtClean="0">
+              <a:rPr lang="en-US" sz="1600" dirty="0" smtClean="0">
                 <a:latin typeface="Courier New" pitchFamily="49" charset="0"/>
                 <a:cs typeface="Courier New" pitchFamily="49" charset="0"/>
               </a:rPr>
               <a:t>="0 0 0" /&gt;</a:t>
             </a:r>
             <a:br>
-              <a:rPr lang="en-US" sz="1900" dirty="0" smtClean="0">
+              <a:rPr lang="en-US" sz="1600" dirty="0" smtClean="0">
                 <a:latin typeface="Courier New" pitchFamily="49" charset="0"/>
                 <a:cs typeface="Courier New" pitchFamily="49" charset="0"/>
               </a:rPr>
             </a:br>
             <a:r>
-              <a:rPr lang="en-US" sz="1900" dirty="0" smtClean="0">
-                <a:latin typeface="Courier New" pitchFamily="49" charset="0"/>
-                <a:cs typeface="Courier New" pitchFamily="49" charset="0"/>
-              </a:rPr>
-              <a:t>	&lt;/visual&gt;</a:t>
-            </a:r>
-            <a:br>
-              <a:rPr lang="en-US" sz="1900" dirty="0" smtClean="0">
-                <a:latin typeface="Courier New" pitchFamily="49" charset="0"/>
-                <a:cs typeface="Courier New" pitchFamily="49" charset="0"/>
-              </a:rPr>
-            </a:br>
-            <a:r>
-              <a:rPr lang="en-US" sz="1900" dirty="0" smtClean="0">
-                <a:latin typeface="Courier New" pitchFamily="49" charset="0"/>
-                <a:cs typeface="Courier New" pitchFamily="49" charset="0"/>
-              </a:rPr>
-              <a:t>	&lt;collision&gt;</a:t>
-            </a:r>
-            <a:br>
-              <a:rPr lang="en-US" sz="1900" dirty="0" smtClean="0">
-                <a:latin typeface="Courier New" pitchFamily="49" charset="0"/>
-                <a:cs typeface="Courier New" pitchFamily="49" charset="0"/>
-              </a:rPr>
-            </a:br>
-            <a:r>
-              <a:rPr lang="en-US" sz="1900" dirty="0" smtClean="0">
-                <a:latin typeface="Courier New" pitchFamily="49" charset="0"/>
-                <a:cs typeface="Courier New" pitchFamily="49" charset="0"/>
-              </a:rPr>
-              <a:t>		&lt;geometry&gt;</a:t>
-            </a:r>
-            <a:br>
-              <a:rPr lang="en-US" sz="1900" dirty="0" smtClean="0">
-                <a:latin typeface="Courier New" pitchFamily="49" charset="0"/>
-                <a:cs typeface="Courier New" pitchFamily="49" charset="0"/>
-              </a:rPr>
-            </a:br>
-            <a:r>
-              <a:rPr lang="en-US" sz="1900" dirty="0" smtClean="0">
-                <a:latin typeface="Courier New" pitchFamily="49" charset="0"/>
-                <a:cs typeface="Courier New" pitchFamily="49" charset="0"/>
-              </a:rPr>
-              <a:t>			&lt;cylinder length="0.1" radius="0.1"/&gt;</a:t>
-            </a:r>
-            <a:br>
-              <a:rPr lang="en-US" sz="1900" dirty="0" smtClean="0">
-                <a:latin typeface="Courier New" pitchFamily="49" charset="0"/>
-                <a:cs typeface="Courier New" pitchFamily="49" charset="0"/>
-              </a:rPr>
-            </a:br>
-            <a:r>
-              <a:rPr lang="en-US" sz="1900" dirty="0" smtClean="0">
-                <a:latin typeface="Courier New" pitchFamily="49" charset="0"/>
-                <a:cs typeface="Courier New" pitchFamily="49" charset="0"/>
-              </a:rPr>
-              <a:t>		&lt;/geometry&gt;</a:t>
-            </a:r>
-            <a:br>
-              <a:rPr lang="en-US" sz="1900" dirty="0" smtClean="0">
-                <a:latin typeface="Courier New" pitchFamily="49" charset="0"/>
-                <a:cs typeface="Courier New" pitchFamily="49" charset="0"/>
-              </a:rPr>
-            </a:br>
-            <a:r>
-              <a:rPr lang="en-US" sz="1900" dirty="0" smtClean="0">
-                <a:latin typeface="Courier New" pitchFamily="49" charset="0"/>
-                <a:cs typeface="Courier New" pitchFamily="49" charset="0"/>
-              </a:rPr>
-              <a:t>		&lt;origin xyz="0 0 -0.05" </a:t>
-            </a:r>
-            <a:r>
-              <a:rPr lang="en-US" sz="1900" dirty="0" err="1" smtClean="0">
-                <a:latin typeface="Courier New" pitchFamily="49" charset="0"/>
-                <a:cs typeface="Courier New" pitchFamily="49" charset="0"/>
-              </a:rPr>
-              <a:t>rpy</a:t>
-            </a:r>
-            <a:r>
-              <a:rPr lang="en-US" sz="1900" dirty="0" smtClean="0">
-                <a:latin typeface="Courier New" pitchFamily="49" charset="0"/>
-                <a:cs typeface="Courier New" pitchFamily="49" charset="0"/>
-              </a:rPr>
-              <a:t>="0 0 0" /&gt;</a:t>
-            </a:r>
-            <a:br>
-              <a:rPr lang="en-US" sz="1900" dirty="0" smtClean="0">
-                <a:latin typeface="Courier New" pitchFamily="49" charset="0"/>
-                <a:cs typeface="Courier New" pitchFamily="49" charset="0"/>
-              </a:rPr>
-            </a:br>
-            <a:r>
-              <a:rPr lang="en-US" sz="1900" dirty="0" smtClean="0">
+              <a:rPr lang="en-US" sz="1600" dirty="0" smtClean="0">
                 <a:latin typeface="Courier New" pitchFamily="49" charset="0"/>
                 <a:cs typeface="Courier New" pitchFamily="49" charset="0"/>
               </a:rPr>
@@ -10968,7 +11428,7 @@
               <a:buNone/>
             </a:pPr>
             <a:r>
-              <a:rPr lang="en-US" sz="1900" dirty="0" smtClean="0">
+              <a:rPr lang="en-US" sz="1600" dirty="0" smtClean="0">
                 <a:latin typeface="Courier New" pitchFamily="49" charset="0"/>
                 <a:cs typeface="Courier New" pitchFamily="49" charset="0"/>
               </a:rPr>
@@ -10993,7 +11453,7 @@
           <a:lstStyle/>
           <a:p>
             <a:r>
-              <a:rPr lang="en-US" dirty="0" smtClean="0"/>
+              <a:rPr lang="en-US" smtClean="0"/>
               <a:t>May 2014</a:t>
             </a:r>
             <a:endParaRPr lang="en-US" dirty="0"/>
@@ -11024,10 +11484,540 @@
           </a:p>
         </p:txBody>
       </p:sp>
+      <p:grpSp>
+        <p:nvGrpSpPr>
+          <p:cNvPr id="11" name="Group 10"/>
+          <p:cNvGrpSpPr/>
+          <p:nvPr/>
+        </p:nvGrpSpPr>
+        <p:grpSpPr>
+          <a:xfrm>
+            <a:off x="3200400" y="5715000"/>
+            <a:ext cx="1634219" cy="804747"/>
+            <a:chOff x="6541911" y="2801815"/>
+            <a:chExt cx="2378316" cy="1143000"/>
+          </a:xfrm>
+        </p:grpSpPr>
+        <p:sp>
+          <p:nvSpPr>
+            <p:cNvPr id="8" name="Rounded Rectangle 7"/>
+            <p:cNvSpPr/>
+            <p:nvPr/>
+          </p:nvSpPr>
+          <p:spPr>
+            <a:xfrm>
+              <a:off x="6541911" y="2801815"/>
+              <a:ext cx="2362200" cy="1143000"/>
+            </a:xfrm>
+            <a:prstGeom prst="roundRect">
+              <a:avLst/>
+            </a:prstGeom>
+          </p:spPr>
+          <p:style>
+            <a:lnRef idx="2">
+              <a:schemeClr val="accent5">
+                <a:shade val="50000"/>
+              </a:schemeClr>
+            </a:lnRef>
+            <a:fillRef idx="1">
+              <a:schemeClr val="accent5"/>
+            </a:fillRef>
+            <a:effectRef idx="0">
+              <a:schemeClr val="accent5"/>
+            </a:effectRef>
+            <a:fontRef idx="minor">
+              <a:schemeClr val="lt1"/>
+            </a:fontRef>
+          </p:style>
+          <p:txBody>
+            <a:bodyPr rtlCol="0" anchor="ctr"/>
+            <a:lstStyle/>
+            <a:p>
+              <a:pPr algn="ctr"/>
+              <a:r>
+                <a:rPr lang="en-US" sz="1400" dirty="0" smtClean="0"/>
+                <a:t>URDF Transforms</a:t>
+              </a:r>
+            </a:p>
+            <a:p>
+              <a:pPr algn="ctr"/>
+              <a:endParaRPr lang="en-US" sz="500" dirty="0" smtClean="0"/>
+            </a:p>
+            <a:p>
+              <a:pPr algn="ctr"/>
+              <a:r>
+                <a:rPr lang="en-US" sz="1100" dirty="0" smtClean="0"/>
+                <a:t>X/Y/Z, Roll/Pitch/Yaw</a:t>
+              </a:r>
+            </a:p>
+            <a:p>
+              <a:pPr algn="ctr"/>
+              <a:r>
+                <a:rPr lang="en-US" sz="1100" dirty="0" smtClean="0"/>
+                <a:t>Meters / Radians</a:t>
+              </a:r>
+              <a:endParaRPr lang="en-US" sz="1100" dirty="0"/>
+            </a:p>
+          </p:txBody>
+        </p:sp>
+        <p:cxnSp>
+          <p:nvCxnSpPr>
+            <p:cNvPr id="10" name="Straight Connector 9"/>
+            <p:cNvCxnSpPr/>
+            <p:nvPr/>
+          </p:nvCxnSpPr>
+          <p:spPr>
+            <a:xfrm>
+              <a:off x="6558027" y="3237549"/>
+              <a:ext cx="2362200" cy="0"/>
+            </a:xfrm>
+            <a:prstGeom prst="line">
+              <a:avLst/>
+            </a:prstGeom>
+            <a:ln w="28575">
+              <a:solidFill>
+                <a:schemeClr val="bg1"/>
+              </a:solidFill>
+            </a:ln>
+          </p:spPr>
+          <p:style>
+            <a:lnRef idx="1">
+              <a:schemeClr val="accent1"/>
+            </a:lnRef>
+            <a:fillRef idx="0">
+              <a:schemeClr val="accent1"/>
+            </a:fillRef>
+            <a:effectRef idx="0">
+              <a:schemeClr val="accent1"/>
+            </a:effectRef>
+            <a:fontRef idx="minor">
+              <a:schemeClr val="tx1"/>
+            </a:fontRef>
+          </p:style>
+        </p:cxnSp>
+      </p:grpSp>
+      <p:grpSp>
+        <p:nvGrpSpPr>
+          <p:cNvPr id="29" name="Group 28"/>
+          <p:cNvGrpSpPr/>
+          <p:nvPr/>
+        </p:nvGrpSpPr>
+        <p:grpSpPr>
+          <a:xfrm>
+            <a:off x="6096000" y="3505200"/>
+            <a:ext cx="2438400" cy="1828800"/>
+            <a:chOff x="6629400" y="3886200"/>
+            <a:chExt cx="2438400" cy="1828800"/>
+          </a:xfrm>
+        </p:grpSpPr>
+        <p:pic>
+          <p:nvPicPr>
+            <p:cNvPr id="2050" name="Picture 2"/>
+            <p:cNvPicPr>
+              <a:picLocks noChangeAspect="1" noChangeArrowheads="1"/>
+            </p:cNvPicPr>
+            <p:nvPr/>
+          </p:nvPicPr>
+          <p:blipFill>
+            <a:blip r:embed="rId2" cstate="print">
+              <a:clrChange>
+                <a:clrFrom>
+                  <a:srgbClr val="FFFFFF"/>
+                </a:clrFrom>
+                <a:clrTo>
+                  <a:srgbClr val="FFFFFF">
+                    <a:alpha val="0"/>
+                  </a:srgbClr>
+                </a:clrTo>
+              </a:clrChange>
+            </a:blip>
+            <a:srcRect l="31000" t="33103" r="27500" b="31724"/>
+            <a:stretch>
+              <a:fillRect/>
+            </a:stretch>
+          </p:blipFill>
+          <p:spPr bwMode="auto">
+            <a:xfrm>
+              <a:off x="6781800" y="3886200"/>
+              <a:ext cx="1943100" cy="1193953"/>
+            </a:xfrm>
+            <a:prstGeom prst="rect">
+              <a:avLst/>
+            </a:prstGeom>
+            <a:noFill/>
+            <a:ln w="9525">
+              <a:noFill/>
+              <a:miter lim="800000"/>
+              <a:headEnd/>
+              <a:tailEnd/>
+            </a:ln>
+          </p:spPr>
+        </p:pic>
+        <p:grpSp>
+          <p:nvGrpSpPr>
+            <p:cNvPr id="20" name="Group 19"/>
+            <p:cNvGrpSpPr/>
+            <p:nvPr/>
+          </p:nvGrpSpPr>
+          <p:grpSpPr>
+            <a:xfrm rot="19955766">
+              <a:off x="6981376" y="4390576"/>
+              <a:ext cx="381000" cy="381000"/>
+              <a:chOff x="7010400" y="5562600"/>
+              <a:chExt cx="381000" cy="381000"/>
+            </a:xfrm>
+          </p:grpSpPr>
+          <p:cxnSp>
+            <p:nvCxnSpPr>
+              <p:cNvPr id="15" name="Straight Arrow Connector 14"/>
+              <p:cNvCxnSpPr/>
+              <p:nvPr/>
+            </p:nvCxnSpPr>
+            <p:spPr>
+              <a:xfrm flipV="1">
+                <a:off x="7010400" y="5562600"/>
+                <a:ext cx="0" cy="381000"/>
+              </a:xfrm>
+              <a:prstGeom prst="straightConnector1">
+                <a:avLst/>
+              </a:prstGeom>
+              <a:ln w="28575">
+                <a:solidFill>
+                  <a:schemeClr val="tx1"/>
+                </a:solidFill>
+                <a:tailEnd type="arrow"/>
+              </a:ln>
+            </p:spPr>
+            <p:style>
+              <a:lnRef idx="1">
+                <a:schemeClr val="accent1"/>
+              </a:lnRef>
+              <a:fillRef idx="0">
+                <a:schemeClr val="accent1"/>
+              </a:fillRef>
+              <a:effectRef idx="0">
+                <a:schemeClr val="accent1"/>
+              </a:effectRef>
+              <a:fontRef idx="minor">
+                <a:schemeClr val="tx1"/>
+              </a:fontRef>
+            </p:style>
+          </p:cxnSp>
+          <p:cxnSp>
+            <p:nvCxnSpPr>
+              <p:cNvPr id="16" name="Straight Arrow Connector 15"/>
+              <p:cNvCxnSpPr/>
+              <p:nvPr/>
+            </p:nvCxnSpPr>
+            <p:spPr>
+              <a:xfrm>
+                <a:off x="7010400" y="5943600"/>
+                <a:ext cx="381000" cy="0"/>
+              </a:xfrm>
+              <a:prstGeom prst="straightConnector1">
+                <a:avLst/>
+              </a:prstGeom>
+              <a:ln w="28575">
+                <a:solidFill>
+                  <a:schemeClr val="tx1"/>
+                </a:solidFill>
+                <a:tailEnd type="arrow"/>
+              </a:ln>
+            </p:spPr>
+            <p:style>
+              <a:lnRef idx="1">
+                <a:schemeClr val="accent1"/>
+              </a:lnRef>
+              <a:fillRef idx="0">
+                <a:schemeClr val="accent1"/>
+              </a:fillRef>
+              <a:effectRef idx="0">
+                <a:schemeClr val="accent1"/>
+              </a:effectRef>
+              <a:fontRef idx="minor">
+                <a:schemeClr val="tx1"/>
+              </a:fontRef>
+            </p:style>
+          </p:cxnSp>
+        </p:grpSp>
+        <p:sp>
+          <p:nvSpPr>
+            <p:cNvPr id="21" name="Rectangle 20"/>
+            <p:cNvSpPr/>
+            <p:nvPr/>
+          </p:nvSpPr>
+          <p:spPr>
+            <a:xfrm rot="20401939">
+              <a:off x="6818310" y="4157485"/>
+              <a:ext cx="1947856" cy="694400"/>
+            </a:xfrm>
+            <a:prstGeom prst="rect">
+              <a:avLst/>
+            </a:prstGeom>
+            <a:noFill/>
+            <a:ln>
+              <a:solidFill>
+                <a:srgbClr val="92D050"/>
+              </a:solidFill>
+              <a:prstDash val="dash"/>
+            </a:ln>
+          </p:spPr>
+          <p:style>
+            <a:lnRef idx="2">
+              <a:schemeClr val="accent1">
+                <a:shade val="50000"/>
+              </a:schemeClr>
+            </a:lnRef>
+            <a:fillRef idx="1">
+              <a:schemeClr val="accent1"/>
+            </a:fillRef>
+            <a:effectRef idx="0">
+              <a:schemeClr val="accent1"/>
+            </a:effectRef>
+            <a:fontRef idx="minor">
+              <a:schemeClr val="lt1"/>
+            </a:fontRef>
+          </p:style>
+          <p:txBody>
+            <a:bodyPr rtlCol="0" anchor="ctr"/>
+            <a:lstStyle/>
+            <a:p>
+              <a:pPr algn="ctr"/>
+              <a:endParaRPr lang="en-US"/>
+            </a:p>
+          </p:txBody>
+        </p:sp>
+        <p:sp>
+          <p:nvSpPr>
+            <p:cNvPr id="22" name="Right Arrow 21"/>
+            <p:cNvSpPr/>
+            <p:nvPr/>
+          </p:nvSpPr>
+          <p:spPr>
+            <a:xfrm rot="17043134">
+              <a:off x="6745816" y="5065457"/>
+              <a:ext cx="533400" cy="185058"/>
+            </a:xfrm>
+            <a:prstGeom prst="rightArrow">
+              <a:avLst/>
+            </a:prstGeom>
+          </p:spPr>
+          <p:style>
+            <a:lnRef idx="2">
+              <a:schemeClr val="accent6">
+                <a:shade val="50000"/>
+              </a:schemeClr>
+            </a:lnRef>
+            <a:fillRef idx="1">
+              <a:schemeClr val="accent6"/>
+            </a:fillRef>
+            <a:effectRef idx="0">
+              <a:schemeClr val="accent6"/>
+            </a:effectRef>
+            <a:fontRef idx="minor">
+              <a:schemeClr val="lt1"/>
+            </a:fontRef>
+          </p:style>
+          <p:txBody>
+            <a:bodyPr rtlCol="0" anchor="ctr"/>
+            <a:lstStyle/>
+            <a:p>
+              <a:pPr algn="ctr"/>
+              <a:endParaRPr lang="en-US"/>
+            </a:p>
+          </p:txBody>
+        </p:sp>
+        <p:sp>
+          <p:nvSpPr>
+            <p:cNvPr id="23" name="TextBox 22"/>
+            <p:cNvSpPr txBox="1"/>
+            <p:nvPr/>
+          </p:nvSpPr>
+          <p:spPr>
+            <a:xfrm>
+              <a:off x="6629400" y="5334000"/>
+              <a:ext cx="762000" cy="307777"/>
+            </a:xfrm>
+            <a:prstGeom prst="rect">
+              <a:avLst/>
+            </a:prstGeom>
+            <a:noFill/>
+          </p:spPr>
+          <p:txBody>
+            <a:bodyPr wrap="square" rtlCol="0">
+              <a:spAutoFit/>
+            </a:bodyPr>
+            <a:lstStyle/>
+            <a:p>
+              <a:r>
+                <a:rPr lang="en-US" sz="1400" dirty="0" smtClean="0"/>
+                <a:t>frame</a:t>
+              </a:r>
+              <a:endParaRPr lang="en-US" sz="1400" dirty="0"/>
+            </a:p>
+          </p:txBody>
+        </p:sp>
+        <p:sp>
+          <p:nvSpPr>
+            <p:cNvPr id="24" name="Right Arrow 23"/>
+            <p:cNvSpPr/>
+            <p:nvPr/>
+          </p:nvSpPr>
+          <p:spPr>
+            <a:xfrm rot="14573255">
+              <a:off x="7481006" y="4682833"/>
+              <a:ext cx="533400" cy="185058"/>
+            </a:xfrm>
+            <a:prstGeom prst="rightArrow">
+              <a:avLst/>
+            </a:prstGeom>
+          </p:spPr>
+          <p:style>
+            <a:lnRef idx="2">
+              <a:schemeClr val="accent6">
+                <a:shade val="50000"/>
+              </a:schemeClr>
+            </a:lnRef>
+            <a:fillRef idx="1">
+              <a:schemeClr val="accent6"/>
+            </a:fillRef>
+            <a:effectRef idx="0">
+              <a:schemeClr val="accent6"/>
+            </a:effectRef>
+            <a:fontRef idx="minor">
+              <a:schemeClr val="lt1"/>
+            </a:fontRef>
+          </p:style>
+          <p:txBody>
+            <a:bodyPr rtlCol="0" anchor="ctr"/>
+            <a:lstStyle/>
+            <a:p>
+              <a:pPr algn="ctr"/>
+              <a:endParaRPr lang="en-US"/>
+            </a:p>
+          </p:txBody>
+        </p:sp>
+        <p:sp>
+          <p:nvSpPr>
+            <p:cNvPr id="25" name="TextBox 24"/>
+            <p:cNvSpPr txBox="1"/>
+            <p:nvPr/>
+          </p:nvSpPr>
+          <p:spPr>
+            <a:xfrm>
+              <a:off x="7391400" y="4953000"/>
+              <a:ext cx="914400" cy="523220"/>
+            </a:xfrm>
+            <a:prstGeom prst="rect">
+              <a:avLst/>
+            </a:prstGeom>
+            <a:noFill/>
+          </p:spPr>
+          <p:txBody>
+            <a:bodyPr wrap="square" rtlCol="0">
+              <a:spAutoFit/>
+            </a:bodyPr>
+            <a:lstStyle/>
+            <a:p>
+              <a:pPr algn="ctr"/>
+              <a:r>
+                <a:rPr lang="en-US" sz="1400" dirty="0" smtClean="0"/>
+                <a:t>visual</a:t>
+              </a:r>
+            </a:p>
+            <a:p>
+              <a:pPr algn="ctr"/>
+              <a:r>
+                <a:rPr lang="en-US" sz="1400" dirty="0" smtClean="0"/>
+                <a:t>geometry</a:t>
+              </a:r>
+              <a:endParaRPr lang="en-US" sz="1400" dirty="0"/>
+            </a:p>
+          </p:txBody>
+        </p:sp>
+        <p:sp>
+          <p:nvSpPr>
+            <p:cNvPr id="26" name="Right Arrow 25"/>
+            <p:cNvSpPr/>
+            <p:nvPr/>
+          </p:nvSpPr>
+          <p:spPr>
+            <a:xfrm rot="14573255">
+              <a:off x="8166806" y="4835233"/>
+              <a:ext cx="533400" cy="185058"/>
+            </a:xfrm>
+            <a:prstGeom prst="rightArrow">
+              <a:avLst/>
+            </a:prstGeom>
+          </p:spPr>
+          <p:style>
+            <a:lnRef idx="2">
+              <a:schemeClr val="accent6">
+                <a:shade val="50000"/>
+              </a:schemeClr>
+            </a:lnRef>
+            <a:fillRef idx="1">
+              <a:schemeClr val="accent6"/>
+            </a:fillRef>
+            <a:effectRef idx="0">
+              <a:schemeClr val="accent6"/>
+            </a:effectRef>
+            <a:fontRef idx="minor">
+              <a:schemeClr val="lt1"/>
+            </a:fontRef>
+          </p:style>
+          <p:txBody>
+            <a:bodyPr rtlCol="0" anchor="ctr"/>
+            <a:lstStyle/>
+            <a:p>
+              <a:pPr algn="ctr"/>
+              <a:endParaRPr lang="en-US"/>
+            </a:p>
+          </p:txBody>
+        </p:sp>
+        <p:sp>
+          <p:nvSpPr>
+            <p:cNvPr id="27" name="TextBox 26"/>
+            <p:cNvSpPr txBox="1"/>
+            <p:nvPr/>
+          </p:nvSpPr>
+          <p:spPr>
+            <a:xfrm>
+              <a:off x="8153400" y="5191780"/>
+              <a:ext cx="914400" cy="523220"/>
+            </a:xfrm>
+            <a:prstGeom prst="rect">
+              <a:avLst/>
+            </a:prstGeom>
+            <a:noFill/>
+          </p:spPr>
+          <p:txBody>
+            <a:bodyPr wrap="square" rtlCol="0">
+              <a:spAutoFit/>
+            </a:bodyPr>
+            <a:lstStyle/>
+            <a:p>
+              <a:pPr algn="ctr"/>
+              <a:r>
+                <a:rPr lang="en-US" sz="1400" dirty="0" smtClean="0"/>
+                <a:t>collision</a:t>
+              </a:r>
+            </a:p>
+            <a:p>
+              <a:pPr algn="ctr"/>
+              <a:r>
+                <a:rPr lang="en-US" sz="1400" dirty="0" smtClean="0"/>
+                <a:t>geometry</a:t>
+              </a:r>
+              <a:endParaRPr lang="en-US" sz="1400" dirty="0"/>
+            </a:p>
+          </p:txBody>
+        </p:sp>
+      </p:grpSp>
     </p:spTree>
     <p:extLst>
       <p:ext uri="{BB962C8B-B14F-4D97-AF65-F5344CB8AC3E}">
-        <p14:creationId xmlns:p14="http://schemas.microsoft.com/office/powerpoint/2010/main" val="1036703678"/>
+        <p14:creationId xmlns="" xmlns:p14="http://schemas.microsoft.com/office/powerpoint/2010/main" val="1036703678"/>
       </p:ext>
     </p:extLst>
   </p:cSld>
@@ -11037,7 +12027,7 @@
   <p:timing>
     <p:tnLst>
       <p:par>
-        <p:cTn xmlns:p14="http://schemas.microsoft.com/office/powerpoint/2010/main" id="1" dur="indefinite" restart="never" nodeType="tmRoot"/>
+        <p:cTn id="1" dur="indefinite" restart="never" nodeType="tmRoot"/>
       </p:par>
     </p:tnLst>
   </p:timing>
@@ -11102,23 +12092,51 @@
         </p:spPr>
         <p:txBody>
           <a:bodyPr>
-            <a:normAutofit fontScale="92500" lnSpcReduction="20000"/>
+            <a:normAutofit fontScale="92500" lnSpcReduction="10000"/>
           </a:bodyPr>
           <a:lstStyle/>
           <a:p>
             <a:r>
               <a:rPr lang="en-US" sz="2600" dirty="0" smtClean="0"/>
-              <a:t>A joint connects 2 links</a:t>
+              <a:t>A </a:t>
+            </a:r>
+            <a:r>
+              <a:rPr lang="en-US" sz="2600" b="1" dirty="0" smtClean="0"/>
+              <a:t>Joint</a:t>
+            </a:r>
+            <a:r>
+              <a:rPr lang="en-US" sz="2600" dirty="0" smtClean="0"/>
+              <a:t> connects 2 </a:t>
+            </a:r>
+            <a:r>
+              <a:rPr lang="en-US" sz="2600" b="1" dirty="0" smtClean="0"/>
+              <a:t>Links</a:t>
             </a:r>
           </a:p>
           <a:p>
             <a:pPr lvl="1"/>
             <a:r>
               <a:rPr lang="en-US" sz="2600" dirty="0" smtClean="0"/>
-              <a:t>Contains </a:t>
-            </a:r>
-            <a:r>
-              <a:rPr lang="en-US" sz="2600" b="1" dirty="0" smtClean="0"/>
+              <a:t>Defines a </a:t>
+            </a:r>
+            <a:r>
+              <a:rPr lang="en-US" sz="2600" b="1" dirty="0" smtClean="0">
+                <a:solidFill>
+                  <a:schemeClr val="accent2"/>
+                </a:solidFill>
+              </a:rPr>
+              <a:t>transform</a:t>
+            </a:r>
+            <a:r>
+              <a:rPr lang="en-US" sz="2600" dirty="0" smtClean="0"/>
+              <a:t> between </a:t>
+            </a:r>
+            <a:r>
+              <a:rPr lang="en-US" sz="2600" b="1" dirty="0" smtClean="0">
+                <a:solidFill>
+                  <a:schemeClr val="accent2"/>
+                </a:solidFill>
+              </a:rPr>
               <a:t>parent</a:t>
             </a:r>
             <a:r>
@@ -11126,40 +12144,29 @@
               <a:t> and </a:t>
             </a:r>
             <a:r>
-              <a:rPr lang="en-US" sz="2600" b="1" dirty="0" smtClean="0"/>
+              <a:rPr lang="en-US" sz="2600" b="1" dirty="0" smtClean="0">
+                <a:solidFill>
+                  <a:schemeClr val="accent2"/>
+                </a:solidFill>
+              </a:rPr>
               <a:t>child</a:t>
             </a:r>
             <a:r>
               <a:rPr lang="en-US" sz="2600" dirty="0" smtClean="0"/>
-              <a:t> frame reference</a:t>
-            </a:r>
-          </a:p>
-          <a:p>
-            <a:pPr lvl="1"/>
-            <a:r>
-              <a:rPr lang="en-US" sz="2600" dirty="0" smtClean="0"/>
-              <a:t>Contains </a:t>
-            </a:r>
-            <a:r>
-              <a:rPr lang="en-US" sz="2600" b="1" dirty="0" smtClean="0"/>
-              <a:t>transform</a:t>
-            </a:r>
-            <a:r>
-              <a:rPr lang="en-US" sz="2600" dirty="0" smtClean="0"/>
-              <a:t> between parent and child frames</a:t>
-            </a:r>
-          </a:p>
-          <a:p>
-            <a:pPr lvl="1"/>
-            <a:r>
-              <a:rPr lang="en-US" sz="2600" dirty="0" smtClean="0"/>
+              <a:t> frames</a:t>
+            </a:r>
+          </a:p>
+          <a:p>
+            <a:pPr lvl="2"/>
+            <a:r>
+              <a:rPr lang="en-US" sz="2200" dirty="0" smtClean="0"/>
               <a:t>Types: </a:t>
             </a:r>
             <a:r>
-              <a:rPr lang="en-US" sz="2600" i="1" dirty="0" smtClean="0"/>
+              <a:rPr lang="en-US" sz="2200" i="1" dirty="0" smtClean="0"/>
               <a:t>fixed, free, linear, rotary</a:t>
             </a:r>
-            <a:endParaRPr lang="en-US" sz="2600" dirty="0" smtClean="0"/>
+            <a:endParaRPr lang="en-US" sz="2200" dirty="0" smtClean="0"/>
           </a:p>
           <a:p>
             <a:pPr lvl="1"/>
@@ -11169,7 +12176,7 @@
             </a:r>
             <a:r>
               <a:rPr lang="en-US" sz="2600" i="1" dirty="0" smtClean="0"/>
-              <a:t>(linear, rotary only)</a:t>
+              <a:t>(for linear / rotary)</a:t>
             </a:r>
           </a:p>
           <a:p>
@@ -11210,128 +12217,86 @@
               <a:buNone/>
             </a:pPr>
             <a:r>
-              <a:rPr lang="en-US" sz="1600" dirty="0" smtClean="0">
-                <a:latin typeface="Courier New" pitchFamily="49" charset="0"/>
-                <a:cs typeface="Courier New" pitchFamily="49" charset="0"/>
-              </a:rPr>
-              <a:t>&lt;joint name="</a:t>
-            </a:r>
-            <a:r>
-              <a:rPr lang="en-US" sz="1600" dirty="0" err="1" smtClean="0">
-                <a:latin typeface="Courier New" pitchFamily="49" charset="0"/>
-                <a:cs typeface="Courier New" pitchFamily="49" charset="0"/>
-              </a:rPr>
-              <a:t>shoulder_pan_joint</a:t>
-            </a:r>
-            <a:r>
-              <a:rPr lang="en-US" sz="1600" dirty="0" smtClean="0">
-                <a:latin typeface="Courier New" pitchFamily="49" charset="0"/>
-                <a:cs typeface="Courier New" pitchFamily="49" charset="0"/>
-              </a:rPr>
-              <a:t>" type="revolute“&gt;</a:t>
+              <a:rPr lang="en-US" sz="1500" dirty="0" smtClean="0">
+                <a:latin typeface="Courier New" pitchFamily="49" charset="0"/>
+                <a:cs typeface="Courier New" pitchFamily="49" charset="0"/>
+              </a:rPr>
+              <a:t>&lt;joint name=“joint_2" type="revolute“&gt;</a:t>
             </a:r>
             <a:br>
-              <a:rPr lang="en-US" sz="1600" dirty="0" smtClean="0">
+              <a:rPr lang="en-US" sz="1500" dirty="0" smtClean="0">
                 <a:latin typeface="Courier New" pitchFamily="49" charset="0"/>
                 <a:cs typeface="Courier New" pitchFamily="49" charset="0"/>
               </a:rPr>
             </a:br>
             <a:r>
-              <a:rPr lang="en-US" sz="1600" dirty="0" smtClean="0">
-                <a:latin typeface="Courier New" pitchFamily="49" charset="0"/>
-                <a:cs typeface="Courier New" pitchFamily="49" charset="0"/>
-              </a:rPr>
-              <a:t>&lt;parent link="</a:t>
-            </a:r>
-            <a:r>
-              <a:rPr lang="en-US" sz="1600" dirty="0" err="1" smtClean="0">
-                <a:latin typeface="Courier New" pitchFamily="49" charset="0"/>
-                <a:cs typeface="Courier New" pitchFamily="49" charset="0"/>
-              </a:rPr>
-              <a:t>base_link</a:t>
-            </a:r>
-            <a:r>
-              <a:rPr lang="en-US" sz="1600" dirty="0" smtClean="0">
-                <a:latin typeface="Courier New" pitchFamily="49" charset="0"/>
-                <a:cs typeface="Courier New" pitchFamily="49" charset="0"/>
-              </a:rPr>
-              <a:t>"/&gt;</a:t>
+              <a:rPr lang="en-US" sz="1500" dirty="0" smtClean="0">
+                <a:latin typeface="Courier New" pitchFamily="49" charset="0"/>
+                <a:cs typeface="Courier New" pitchFamily="49" charset="0"/>
+              </a:rPr>
+              <a:t>&lt;parent link=“link_1"/&gt;</a:t>
             </a:r>
             <a:br>
-              <a:rPr lang="en-US" sz="1600" dirty="0" smtClean="0">
+              <a:rPr lang="en-US" sz="1500" dirty="0" smtClean="0">
                 <a:latin typeface="Courier New" pitchFamily="49" charset="0"/>
                 <a:cs typeface="Courier New" pitchFamily="49" charset="0"/>
               </a:rPr>
             </a:br>
             <a:r>
-              <a:rPr lang="en-US" sz="1600" dirty="0" smtClean="0">
-                <a:latin typeface="Courier New" pitchFamily="49" charset="0"/>
-                <a:cs typeface="Courier New" pitchFamily="49" charset="0"/>
-              </a:rPr>
-              <a:t>&lt;child link="</a:t>
-            </a:r>
-            <a:r>
-              <a:rPr lang="en-US" sz="1600" dirty="0" err="1" smtClean="0">
-                <a:latin typeface="Courier New" pitchFamily="49" charset="0"/>
-                <a:cs typeface="Courier New" pitchFamily="49" charset="0"/>
-              </a:rPr>
-              <a:t>shoulder_link</a:t>
-            </a:r>
-            <a:r>
-              <a:rPr lang="en-US" sz="1600" dirty="0" smtClean="0">
-                <a:latin typeface="Courier New" pitchFamily="49" charset="0"/>
-                <a:cs typeface="Courier New" pitchFamily="49" charset="0"/>
-              </a:rPr>
-              <a:t>"/&gt;</a:t>
+              <a:rPr lang="en-US" sz="1500" dirty="0" smtClean="0">
+                <a:latin typeface="Courier New" pitchFamily="49" charset="0"/>
+                <a:cs typeface="Courier New" pitchFamily="49" charset="0"/>
+              </a:rPr>
+              <a:t>&lt;child link=“link_2"/&gt;</a:t>
             </a:r>
             <a:br>
-              <a:rPr lang="en-US" sz="1600" dirty="0" smtClean="0">
+              <a:rPr lang="en-US" sz="1500" dirty="0" smtClean="0">
                 <a:latin typeface="Courier New" pitchFamily="49" charset="0"/>
                 <a:cs typeface="Courier New" pitchFamily="49" charset="0"/>
               </a:rPr>
             </a:br>
             <a:r>
-              <a:rPr lang="en-US" sz="1600" dirty="0" smtClean="0">
-                <a:latin typeface="Courier New" pitchFamily="49" charset="0"/>
-                <a:cs typeface="Courier New" pitchFamily="49" charset="0"/>
-              </a:rPr>
-              <a:t>&lt;origin xyz="0 0 0.1" </a:t>
-            </a:r>
-            <a:r>
-              <a:rPr lang="en-US" sz="1600" dirty="0" err="1" smtClean="0">
+              <a:rPr lang="en-US" sz="1500" dirty="0" smtClean="0">
+                <a:latin typeface="Courier New" pitchFamily="49" charset="0"/>
+                <a:cs typeface="Courier New" pitchFamily="49" charset="0"/>
+              </a:rPr>
+              <a:t>&lt;origin xyz=“0.2 0.2 0" </a:t>
+            </a:r>
+            <a:r>
+              <a:rPr lang="en-US" sz="1500" dirty="0" err="1" smtClean="0">
                 <a:latin typeface="Courier New" pitchFamily="49" charset="0"/>
                 <a:cs typeface="Courier New" pitchFamily="49" charset="0"/>
               </a:rPr>
               <a:t>rpy</a:t>
             </a:r>
             <a:r>
-              <a:rPr lang="en-US" sz="1600" dirty="0" smtClean="0">
+              <a:rPr lang="en-US" sz="1500" dirty="0" smtClean="0">
                 <a:latin typeface="Courier New" pitchFamily="49" charset="0"/>
                 <a:cs typeface="Courier New" pitchFamily="49" charset="0"/>
               </a:rPr>
               <a:t>="0 0 0"/&gt;</a:t>
             </a:r>
             <a:br>
-              <a:rPr lang="en-US" sz="1600" dirty="0" smtClean="0">
+              <a:rPr lang="en-US" sz="1500" dirty="0" smtClean="0">
                 <a:latin typeface="Courier New" pitchFamily="49" charset="0"/>
                 <a:cs typeface="Courier New" pitchFamily="49" charset="0"/>
               </a:rPr>
             </a:br>
             <a:r>
-              <a:rPr lang="en-US" sz="1600" dirty="0" smtClean="0">
-                <a:latin typeface="Courier New" pitchFamily="49" charset="0"/>
-                <a:cs typeface="Courier New" pitchFamily="49" charset="0"/>
-              </a:rPr>
-              <a:t>&lt;axis xyz="0 0 1"/&gt; </a:t>
+              <a:rPr lang="en-US" sz="1500" dirty="0" smtClean="0">
+                <a:latin typeface="Courier New" pitchFamily="49" charset="0"/>
+                <a:cs typeface="Courier New" pitchFamily="49" charset="0"/>
+              </a:rPr>
+              <a:t>&lt;axis xyz=“0 0 1"/&gt; </a:t>
             </a:r>
             <a:br>
-              <a:rPr lang="en-US" sz="1600" dirty="0" smtClean="0">
+              <a:rPr lang="en-US" sz="1500" dirty="0" smtClean="0">
                 <a:latin typeface="Courier New" pitchFamily="49" charset="0"/>
                 <a:cs typeface="Courier New" pitchFamily="49" charset="0"/>
               </a:rPr>
             </a:br>
             <a:r>
-              <a:rPr lang="en-US" sz="1600" dirty="0" smtClean="0">
+              <a:rPr lang="en-US" sz="1500" dirty="0" smtClean="0">
                 <a:latin typeface="Courier New" pitchFamily="49" charset="0"/>
                 <a:cs typeface="Courier New" pitchFamily="49" charset="0"/>
               </a:rPr>
@@ -11343,7 +12308,7 @@
               <a:buNone/>
             </a:pPr>
             <a:r>
-              <a:rPr lang="en-US" sz="1600" dirty="0" smtClean="0">
+              <a:rPr lang="en-US" sz="1500" dirty="0" smtClean="0">
                 <a:latin typeface="Courier New" pitchFamily="49" charset="0"/>
                 <a:cs typeface="Courier New" pitchFamily="49" charset="0"/>
               </a:rPr>
@@ -11368,7 +12333,7 @@
           <a:lstStyle/>
           <a:p>
             <a:r>
-              <a:rPr lang="en-US" dirty="0" smtClean="0"/>
+              <a:rPr lang="en-US" smtClean="0"/>
               <a:t>May 2014</a:t>
             </a:r>
             <a:endParaRPr lang="en-US" dirty="0"/>
@@ -11399,10 +12364,417 @@
           </a:p>
         </p:txBody>
       </p:sp>
+      <p:grpSp>
+        <p:nvGrpSpPr>
+          <p:cNvPr id="28" name="Group 27"/>
+          <p:cNvGrpSpPr/>
+          <p:nvPr/>
+        </p:nvGrpSpPr>
+        <p:grpSpPr>
+          <a:xfrm>
+            <a:off x="6275923" y="4429248"/>
+            <a:ext cx="2726488" cy="1504139"/>
+            <a:chOff x="6275923" y="4429248"/>
+            <a:chExt cx="2726488" cy="1504139"/>
+          </a:xfrm>
+        </p:grpSpPr>
+        <p:sp>
+          <p:nvSpPr>
+            <p:cNvPr id="7" name="Rounded Rectangle 6"/>
+            <p:cNvSpPr/>
+            <p:nvPr/>
+          </p:nvSpPr>
+          <p:spPr>
+            <a:xfrm rot="19204572">
+              <a:off x="6275923" y="4904244"/>
+              <a:ext cx="1676400" cy="457200"/>
+            </a:xfrm>
+            <a:prstGeom prst="roundRect">
+              <a:avLst>
+                <a:gd name="adj" fmla="val 50000"/>
+              </a:avLst>
+            </a:prstGeom>
+          </p:spPr>
+          <p:style>
+            <a:lnRef idx="2">
+              <a:schemeClr val="accent1">
+                <a:shade val="50000"/>
+              </a:schemeClr>
+            </a:lnRef>
+            <a:fillRef idx="1">
+              <a:schemeClr val="accent1"/>
+            </a:fillRef>
+            <a:effectRef idx="0">
+              <a:schemeClr val="accent1"/>
+            </a:effectRef>
+            <a:fontRef idx="minor">
+              <a:schemeClr val="lt1"/>
+            </a:fontRef>
+          </p:style>
+          <p:txBody>
+            <a:bodyPr rtlCol="0" anchor="ctr"/>
+            <a:lstStyle/>
+            <a:p>
+              <a:pPr algn="ctr"/>
+              <a:endParaRPr lang="en-US"/>
+            </a:p>
+          </p:txBody>
+        </p:sp>
+        <p:sp>
+          <p:nvSpPr>
+            <p:cNvPr id="8" name="Rounded Rectangle 7"/>
+            <p:cNvSpPr/>
+            <p:nvPr/>
+          </p:nvSpPr>
+          <p:spPr>
+            <a:xfrm rot="21420083">
+              <a:off x="7326011" y="4463134"/>
+              <a:ext cx="1676400" cy="457200"/>
+            </a:xfrm>
+            <a:prstGeom prst="roundRect">
+              <a:avLst>
+                <a:gd name="adj" fmla="val 50000"/>
+              </a:avLst>
+            </a:prstGeom>
+          </p:spPr>
+          <p:style>
+            <a:lnRef idx="2">
+              <a:schemeClr val="accent1">
+                <a:shade val="50000"/>
+              </a:schemeClr>
+            </a:lnRef>
+            <a:fillRef idx="1">
+              <a:schemeClr val="accent1"/>
+            </a:fillRef>
+            <a:effectRef idx="0">
+              <a:schemeClr val="accent1"/>
+            </a:effectRef>
+            <a:fontRef idx="minor">
+              <a:schemeClr val="lt1"/>
+            </a:fontRef>
+          </p:style>
+          <p:txBody>
+            <a:bodyPr rtlCol="0" anchor="ctr"/>
+            <a:lstStyle/>
+            <a:p>
+              <a:pPr algn="ctr"/>
+              <a:endParaRPr lang="en-US"/>
+            </a:p>
+          </p:txBody>
+        </p:sp>
+        <p:grpSp>
+          <p:nvGrpSpPr>
+            <p:cNvPr id="11" name="Group 10"/>
+            <p:cNvGrpSpPr/>
+            <p:nvPr/>
+          </p:nvGrpSpPr>
+          <p:grpSpPr>
+            <a:xfrm rot="1717506">
+              <a:off x="6617128" y="5326338"/>
+              <a:ext cx="447303" cy="381000"/>
+              <a:chOff x="6541720" y="5225936"/>
+              <a:chExt cx="447303" cy="381000"/>
+            </a:xfrm>
+          </p:grpSpPr>
+          <p:cxnSp>
+            <p:nvCxnSpPr>
+              <p:cNvPr id="9" name="Straight Arrow Connector 8"/>
+              <p:cNvCxnSpPr/>
+              <p:nvPr/>
+            </p:nvCxnSpPr>
+            <p:spPr>
+              <a:xfrm rot="19955766" flipV="1">
+                <a:off x="6541720" y="5225936"/>
+                <a:ext cx="0" cy="381000"/>
+              </a:xfrm>
+              <a:prstGeom prst="straightConnector1">
+                <a:avLst/>
+              </a:prstGeom>
+              <a:ln w="28575">
+                <a:solidFill>
+                  <a:schemeClr val="tx1"/>
+                </a:solidFill>
+                <a:tailEnd type="arrow"/>
+              </a:ln>
+            </p:spPr>
+            <p:style>
+              <a:lnRef idx="1">
+                <a:schemeClr val="accent1"/>
+              </a:lnRef>
+              <a:fillRef idx="0">
+                <a:schemeClr val="accent1"/>
+              </a:fillRef>
+              <a:effectRef idx="0">
+                <a:schemeClr val="accent1"/>
+              </a:effectRef>
+              <a:fontRef idx="minor">
+                <a:schemeClr val="tx1"/>
+              </a:fontRef>
+            </p:style>
+          </p:cxnSp>
+          <p:cxnSp>
+            <p:nvCxnSpPr>
+              <p:cNvPr id="10" name="Straight Arrow Connector 9"/>
+              <p:cNvCxnSpPr/>
+              <p:nvPr/>
+            </p:nvCxnSpPr>
+            <p:spPr>
+              <a:xfrm rot="19955766">
+                <a:off x="6608023" y="5497879"/>
+                <a:ext cx="381000" cy="0"/>
+              </a:xfrm>
+              <a:prstGeom prst="straightConnector1">
+                <a:avLst/>
+              </a:prstGeom>
+              <a:ln w="28575">
+                <a:solidFill>
+                  <a:schemeClr val="tx1"/>
+                </a:solidFill>
+                <a:tailEnd type="arrow"/>
+              </a:ln>
+            </p:spPr>
+            <p:style>
+              <a:lnRef idx="1">
+                <a:schemeClr val="accent1"/>
+              </a:lnRef>
+              <a:fillRef idx="0">
+                <a:schemeClr val="accent1"/>
+              </a:fillRef>
+              <a:effectRef idx="0">
+                <a:schemeClr val="accent1"/>
+              </a:effectRef>
+              <a:fontRef idx="minor">
+                <a:schemeClr val="tx1"/>
+              </a:fontRef>
+            </p:style>
+          </p:cxnSp>
+        </p:grpSp>
+        <p:grpSp>
+          <p:nvGrpSpPr>
+            <p:cNvPr id="12" name="Group 11"/>
+            <p:cNvGrpSpPr/>
+            <p:nvPr/>
+          </p:nvGrpSpPr>
+          <p:grpSpPr>
+            <a:xfrm rot="1518008">
+              <a:off x="7532639" y="4429248"/>
+              <a:ext cx="447303" cy="381000"/>
+              <a:chOff x="6541719" y="5225937"/>
+              <a:chExt cx="447303" cy="381000"/>
+            </a:xfrm>
+          </p:grpSpPr>
+          <p:cxnSp>
+            <p:nvCxnSpPr>
+              <p:cNvPr id="13" name="Straight Arrow Connector 12"/>
+              <p:cNvCxnSpPr/>
+              <p:nvPr/>
+            </p:nvCxnSpPr>
+            <p:spPr>
+              <a:xfrm rot="19955766" flipV="1">
+                <a:off x="6541719" y="5225937"/>
+                <a:ext cx="0" cy="381000"/>
+              </a:xfrm>
+              <a:prstGeom prst="straightConnector1">
+                <a:avLst/>
+              </a:prstGeom>
+              <a:ln w="28575">
+                <a:solidFill>
+                  <a:schemeClr val="tx1"/>
+                </a:solidFill>
+                <a:tailEnd type="arrow"/>
+              </a:ln>
+            </p:spPr>
+            <p:style>
+              <a:lnRef idx="1">
+                <a:schemeClr val="accent1"/>
+              </a:lnRef>
+              <a:fillRef idx="0">
+                <a:schemeClr val="accent1"/>
+              </a:fillRef>
+              <a:effectRef idx="0">
+                <a:schemeClr val="accent1"/>
+              </a:effectRef>
+              <a:fontRef idx="minor">
+                <a:schemeClr val="tx1"/>
+              </a:fontRef>
+            </p:style>
+          </p:cxnSp>
+          <p:cxnSp>
+            <p:nvCxnSpPr>
+              <p:cNvPr id="14" name="Straight Arrow Connector 13"/>
+              <p:cNvCxnSpPr/>
+              <p:nvPr/>
+            </p:nvCxnSpPr>
+            <p:spPr>
+              <a:xfrm rot="19955766">
+                <a:off x="6608022" y="5497880"/>
+                <a:ext cx="381000" cy="0"/>
+              </a:xfrm>
+              <a:prstGeom prst="straightConnector1">
+                <a:avLst/>
+              </a:prstGeom>
+              <a:ln w="28575">
+                <a:solidFill>
+                  <a:schemeClr val="tx1"/>
+                </a:solidFill>
+                <a:tailEnd type="arrow"/>
+              </a:ln>
+            </p:spPr>
+            <p:style>
+              <a:lnRef idx="1">
+                <a:schemeClr val="accent1"/>
+              </a:lnRef>
+              <a:fillRef idx="0">
+                <a:schemeClr val="accent1"/>
+              </a:fillRef>
+              <a:effectRef idx="0">
+                <a:schemeClr val="accent1"/>
+              </a:effectRef>
+              <a:fontRef idx="minor">
+                <a:schemeClr val="tx1"/>
+              </a:fontRef>
+            </p:style>
+          </p:cxnSp>
+        </p:grpSp>
+        <p:sp>
+          <p:nvSpPr>
+            <p:cNvPr id="15" name="TextBox 14"/>
+            <p:cNvSpPr txBox="1"/>
+            <p:nvPr/>
+          </p:nvSpPr>
+          <p:spPr>
+            <a:xfrm rot="19080003">
+              <a:off x="6634509" y="5625610"/>
+              <a:ext cx="762000" cy="307777"/>
+            </a:xfrm>
+            <a:prstGeom prst="rect">
+              <a:avLst/>
+            </a:prstGeom>
+            <a:noFill/>
+          </p:spPr>
+          <p:txBody>
+            <a:bodyPr wrap="square" rtlCol="0">
+              <a:spAutoFit/>
+            </a:bodyPr>
+            <a:lstStyle/>
+            <a:p>
+              <a:r>
+                <a:rPr lang="en-US" sz="1400" dirty="0" smtClean="0"/>
+                <a:t>link_1</a:t>
+              </a:r>
+              <a:endParaRPr lang="en-US" sz="1400" dirty="0"/>
+            </a:p>
+          </p:txBody>
+        </p:sp>
+        <p:sp>
+          <p:nvSpPr>
+            <p:cNvPr id="16" name="TextBox 15"/>
+            <p:cNvSpPr txBox="1"/>
+            <p:nvPr/>
+          </p:nvSpPr>
+          <p:spPr>
+            <a:xfrm>
+              <a:off x="7543800" y="4953000"/>
+              <a:ext cx="762000" cy="307777"/>
+            </a:xfrm>
+            <a:prstGeom prst="rect">
+              <a:avLst/>
+            </a:prstGeom>
+            <a:noFill/>
+          </p:spPr>
+          <p:txBody>
+            <a:bodyPr wrap="square" rtlCol="0">
+              <a:spAutoFit/>
+            </a:bodyPr>
+            <a:lstStyle/>
+            <a:p>
+              <a:r>
+                <a:rPr lang="en-US" sz="1400" dirty="0" smtClean="0"/>
+                <a:t>link_2</a:t>
+              </a:r>
+              <a:endParaRPr lang="en-US" sz="1400" dirty="0"/>
+            </a:p>
+          </p:txBody>
+        </p:sp>
+        <p:cxnSp>
+          <p:nvCxnSpPr>
+            <p:cNvPr id="19" name="Straight Arrow Connector 18"/>
+            <p:cNvCxnSpPr/>
+            <p:nvPr/>
+          </p:nvCxnSpPr>
+          <p:spPr>
+            <a:xfrm flipV="1">
+              <a:off x="6629400" y="4724400"/>
+              <a:ext cx="914400" cy="838200"/>
+            </a:xfrm>
+            <a:prstGeom prst="straightConnector1">
+              <a:avLst/>
+            </a:prstGeom>
+            <a:ln w="28575">
+              <a:solidFill>
+                <a:srgbClr val="FF0000"/>
+              </a:solidFill>
+              <a:tailEnd type="arrow"/>
+            </a:ln>
+          </p:spPr>
+          <p:style>
+            <a:lnRef idx="1">
+              <a:schemeClr val="accent1"/>
+            </a:lnRef>
+            <a:fillRef idx="0">
+              <a:schemeClr val="accent1"/>
+            </a:fillRef>
+            <a:effectRef idx="0">
+              <a:schemeClr val="accent1"/>
+            </a:effectRef>
+            <a:fontRef idx="minor">
+              <a:schemeClr val="tx1"/>
+            </a:fontRef>
+          </p:style>
+        </p:cxnSp>
+        <p:sp>
+          <p:nvSpPr>
+            <p:cNvPr id="27" name="TextBox 26"/>
+            <p:cNvSpPr txBox="1"/>
+            <p:nvPr/>
+          </p:nvSpPr>
+          <p:spPr>
+            <a:xfrm rot="19254747">
+              <a:off x="6476143" y="4718159"/>
+              <a:ext cx="762000" cy="307777"/>
+            </a:xfrm>
+            <a:prstGeom prst="rect">
+              <a:avLst/>
+            </a:prstGeom>
+            <a:noFill/>
+          </p:spPr>
+          <p:txBody>
+            <a:bodyPr wrap="square" rtlCol="0">
+              <a:spAutoFit/>
+            </a:bodyPr>
+            <a:lstStyle/>
+            <a:p>
+              <a:r>
+                <a:rPr lang="en-US" sz="1400" dirty="0" smtClean="0">
+                  <a:solidFill>
+                    <a:schemeClr val="accent2"/>
+                  </a:solidFill>
+                </a:rPr>
+                <a:t>joint_2</a:t>
+              </a:r>
+              <a:endParaRPr lang="en-US" sz="1400" dirty="0">
+                <a:solidFill>
+                  <a:schemeClr val="accent2"/>
+                </a:solidFill>
+              </a:endParaRPr>
+            </a:p>
+          </p:txBody>
+        </p:sp>
+      </p:grpSp>
     </p:spTree>
     <p:extLst>
       <p:ext uri="{BB962C8B-B14F-4D97-AF65-F5344CB8AC3E}">
-        <p14:creationId xmlns:p14="http://schemas.microsoft.com/office/powerpoint/2010/main" val="1036703678"/>
+        <p14:creationId xmlns="" xmlns:p14="http://schemas.microsoft.com/office/powerpoint/2010/main" val="1036703678"/>
       </p:ext>
     </p:extLst>
   </p:cSld>
@@ -11412,7 +12784,7 @@
   <p:timing>
     <p:tnLst>
       <p:par>
-        <p:cTn xmlns:p14="http://schemas.microsoft.com/office/powerpoint/2010/main" id="1" dur="indefinite" restart="never" nodeType="tmRoot"/>
+        <p:cTn id="1" dur="indefinite" restart="never" nodeType="tmRoot"/>
       </p:par>
     </p:tnLst>
   </p:timing>
@@ -11453,9 +12825,353 @@
           <a:p>
             <a:r>
               <a:rPr lang="en-US" dirty="0" smtClean="0"/>
-              <a:t>Contact Info.</a:t>
+              <a:t>URDF: XACRO</a:t>
             </a:r>
             <a:endParaRPr lang="en-US" dirty="0"/>
+          </a:p>
+        </p:txBody>
+      </p:sp>
+      <p:sp>
+        <p:nvSpPr>
+          <p:cNvPr id="3" name="Content Placeholder 2"/>
+          <p:cNvSpPr>
+            <a:spLocks noGrp="1"/>
+          </p:cNvSpPr>
+          <p:nvPr>
+            <p:ph idx="1"/>
+          </p:nvPr>
+        </p:nvSpPr>
+        <p:spPr>
+          <a:xfrm>
+            <a:off x="457200" y="1066800"/>
+            <a:ext cx="8229600" cy="5105400"/>
+          </a:xfrm>
+        </p:spPr>
+        <p:txBody>
+          <a:bodyPr>
+            <a:normAutofit fontScale="92500" lnSpcReduction="10000"/>
+          </a:bodyPr>
+          <a:lstStyle/>
+          <a:p>
+            <a:r>
+              <a:rPr lang="en-US" sz="2600" b="1" dirty="0" smtClean="0"/>
+              <a:t>XACRO</a:t>
+            </a:r>
+            <a:r>
+              <a:rPr lang="en-US" sz="2600" dirty="0" smtClean="0"/>
+              <a:t> is an XML-based “</a:t>
+            </a:r>
+            <a:r>
+              <a:rPr lang="en-US" sz="2600" dirty="0" smtClean="0">
+                <a:solidFill>
+                  <a:schemeClr val="accent6"/>
+                </a:solidFill>
+              </a:rPr>
+              <a:t>macro language</a:t>
+            </a:r>
+            <a:r>
+              <a:rPr lang="en-US" sz="2600" dirty="0" smtClean="0"/>
+              <a:t>” for building </a:t>
+            </a:r>
+            <a:r>
+              <a:rPr lang="en-US" sz="2600" dirty="0" smtClean="0">
+                <a:solidFill>
+                  <a:schemeClr val="accent6"/>
+                </a:solidFill>
+              </a:rPr>
+              <a:t>URDFs</a:t>
+            </a:r>
+            <a:endParaRPr lang="en-US" sz="2600" b="1" dirty="0" smtClean="0">
+              <a:solidFill>
+                <a:schemeClr val="accent6"/>
+              </a:solidFill>
+            </a:endParaRPr>
+          </a:p>
+          <a:p>
+            <a:pPr lvl="1"/>
+            <a:r>
+              <a:rPr lang="en-US" sz="2200" dirty="0" smtClean="0"/>
+              <a:t>&lt;Include&gt; other XACROs, with parameters</a:t>
+            </a:r>
+          </a:p>
+          <a:p>
+            <a:pPr lvl="1"/>
+            <a:r>
+              <a:rPr lang="en-US" sz="2200" dirty="0" smtClean="0"/>
+              <a:t>Simple expressions: math, </a:t>
+            </a:r>
+            <a:r>
+              <a:rPr lang="en-US" sz="2200" dirty="0" err="1" smtClean="0"/>
+              <a:t>subtitution</a:t>
+            </a:r>
+            <a:endParaRPr lang="en-US" sz="2200" dirty="0" smtClean="0"/>
+          </a:p>
+          <a:p>
+            <a:r>
+              <a:rPr lang="en-US" sz="2600" dirty="0" smtClean="0"/>
+              <a:t>Used to build complex URDFs</a:t>
+            </a:r>
+          </a:p>
+          <a:p>
+            <a:pPr lvl="1"/>
+            <a:r>
+              <a:rPr lang="en-US" sz="2200" dirty="0" smtClean="0"/>
+              <a:t>multi-robot </a:t>
+            </a:r>
+            <a:r>
+              <a:rPr lang="en-US" sz="2200" dirty="0" err="1" smtClean="0"/>
+              <a:t>workcells</a:t>
+            </a:r>
+            <a:endParaRPr lang="en-US" sz="2200" dirty="0" smtClean="0"/>
+          </a:p>
+          <a:p>
+            <a:pPr lvl="1"/>
+            <a:r>
+              <a:rPr lang="en-US" sz="2200" dirty="0" smtClean="0"/>
+              <a:t>reuse standard URDFs (e.g. robots, tooling)</a:t>
+            </a:r>
+          </a:p>
+          <a:p>
+            <a:pPr>
+              <a:buNone/>
+            </a:pPr>
+            <a:endParaRPr lang="en-US" sz="1600" dirty="0" smtClean="0"/>
+          </a:p>
+          <a:p>
+            <a:pPr>
+              <a:buNone/>
+            </a:pPr>
+            <a:r>
+              <a:rPr lang="en-US" sz="1500" dirty="0" smtClean="0">
+                <a:latin typeface="Courier New" pitchFamily="49" charset="0"/>
+                <a:cs typeface="Courier New" pitchFamily="49" charset="0"/>
+              </a:rPr>
+              <a:t>&lt;</a:t>
+            </a:r>
+            <a:r>
+              <a:rPr lang="en-US" sz="1500" dirty="0" err="1" smtClean="0">
+                <a:latin typeface="Courier New" pitchFamily="49" charset="0"/>
+                <a:cs typeface="Courier New" pitchFamily="49" charset="0"/>
+              </a:rPr>
+              <a:t>xacro:include</a:t>
+            </a:r>
+            <a:r>
+              <a:rPr lang="en-US" sz="1500" dirty="0" smtClean="0">
+                <a:latin typeface="Courier New" pitchFamily="49" charset="0"/>
+                <a:cs typeface="Courier New" pitchFamily="49" charset="0"/>
+              </a:rPr>
+              <a:t> filename=“</a:t>
+            </a:r>
+            <a:r>
+              <a:rPr lang="en-US" sz="1500" dirty="0" err="1" smtClean="0">
+                <a:latin typeface="Courier New" pitchFamily="49" charset="0"/>
+                <a:cs typeface="Courier New" pitchFamily="49" charset="0"/>
+              </a:rPr>
+              <a:t>myRobot.xacro</a:t>
+            </a:r>
+            <a:r>
+              <a:rPr lang="en-US" sz="1500" dirty="0" smtClean="0">
+                <a:latin typeface="Courier New" pitchFamily="49" charset="0"/>
+                <a:cs typeface="Courier New" pitchFamily="49" charset="0"/>
+              </a:rPr>
+              <a:t>”/&gt;</a:t>
+            </a:r>
+          </a:p>
+          <a:p>
+            <a:pPr>
+              <a:buNone/>
+            </a:pPr>
+            <a:endParaRPr lang="en-US" sz="1500" dirty="0" smtClean="0">
+              <a:latin typeface="Courier New" pitchFamily="49" charset="0"/>
+              <a:cs typeface="Courier New" pitchFamily="49" charset="0"/>
+            </a:endParaRPr>
+          </a:p>
+          <a:p>
+            <a:pPr>
+              <a:buNone/>
+            </a:pPr>
+            <a:r>
+              <a:rPr lang="en-US" sz="1500" dirty="0" smtClean="0">
+                <a:latin typeface="Courier New" pitchFamily="49" charset="0"/>
+                <a:cs typeface="Courier New" pitchFamily="49" charset="0"/>
+              </a:rPr>
+              <a:t>&lt;</a:t>
+            </a:r>
+            <a:r>
+              <a:rPr lang="en-US" sz="1500" dirty="0" err="1" smtClean="0">
+                <a:latin typeface="Courier New" pitchFamily="49" charset="0"/>
+                <a:cs typeface="Courier New" pitchFamily="49" charset="0"/>
+              </a:rPr>
+              <a:t>xacro:myRobot</a:t>
+            </a:r>
+            <a:r>
+              <a:rPr lang="en-US" sz="1500" dirty="0" smtClean="0">
+                <a:latin typeface="Courier New" pitchFamily="49" charset="0"/>
+                <a:cs typeface="Courier New" pitchFamily="49" charset="0"/>
+              </a:rPr>
+              <a:t> prefix=“left_”/&gt;</a:t>
+            </a:r>
+          </a:p>
+          <a:p>
+            <a:pPr>
+              <a:buNone/>
+            </a:pPr>
+            <a:r>
+              <a:rPr lang="en-US" sz="1500" dirty="0" smtClean="0">
+                <a:latin typeface="Courier New" pitchFamily="49" charset="0"/>
+                <a:cs typeface="Courier New" pitchFamily="49" charset="0"/>
+              </a:rPr>
+              <a:t>&lt;</a:t>
+            </a:r>
+            <a:r>
+              <a:rPr lang="en-US" sz="1500" dirty="0" err="1" smtClean="0">
+                <a:latin typeface="Courier New" pitchFamily="49" charset="0"/>
+                <a:cs typeface="Courier New" pitchFamily="49" charset="0"/>
+              </a:rPr>
+              <a:t>xacro:myRobot</a:t>
+            </a:r>
+            <a:r>
+              <a:rPr lang="en-US" sz="1500" dirty="0" smtClean="0">
+                <a:latin typeface="Courier New" pitchFamily="49" charset="0"/>
+                <a:cs typeface="Courier New" pitchFamily="49" charset="0"/>
+              </a:rPr>
+              <a:t> prefix=“right_”/&gt;</a:t>
+            </a:r>
+          </a:p>
+          <a:p>
+            <a:pPr>
+              <a:buNone/>
+            </a:pPr>
+            <a:endParaRPr lang="en-US" sz="1500" dirty="0" smtClean="0">
+              <a:latin typeface="Courier New" pitchFamily="49" charset="0"/>
+              <a:cs typeface="Courier New" pitchFamily="49" charset="0"/>
+            </a:endParaRPr>
+          </a:p>
+          <a:p>
+            <a:pPr>
+              <a:buNone/>
+            </a:pPr>
+            <a:r>
+              <a:rPr lang="en-US" sz="1500" dirty="0" smtClean="0">
+                <a:latin typeface="Courier New" pitchFamily="49" charset="0"/>
+                <a:cs typeface="Courier New" pitchFamily="49" charset="0"/>
+              </a:rPr>
+              <a:t>&lt;property name=“offset” value=“1.3”/&gt;</a:t>
+            </a:r>
+          </a:p>
+          <a:p>
+            <a:pPr>
+              <a:buNone/>
+            </a:pPr>
+            <a:endParaRPr lang="en-US" sz="1500" dirty="0" smtClean="0">
+              <a:latin typeface="Courier New" pitchFamily="49" charset="0"/>
+              <a:cs typeface="Courier New" pitchFamily="49" charset="0"/>
+            </a:endParaRPr>
+          </a:p>
+          <a:p>
+            <a:pPr>
+              <a:buNone/>
+            </a:pPr>
+            <a:r>
+              <a:rPr lang="en-US" sz="1500" dirty="0" smtClean="0">
+                <a:latin typeface="Courier New" pitchFamily="49" charset="0"/>
+                <a:cs typeface="Courier New" pitchFamily="49" charset="0"/>
+              </a:rPr>
+              <a:t>&lt;joint name=“</a:t>
+            </a:r>
+            <a:r>
+              <a:rPr lang="en-US" sz="1500" dirty="0" err="1" smtClean="0">
+                <a:latin typeface="Courier New" pitchFamily="49" charset="0"/>
+                <a:cs typeface="Courier New" pitchFamily="49" charset="0"/>
+              </a:rPr>
+              <a:t>world_to_left</a:t>
+            </a:r>
+            <a:r>
+              <a:rPr lang="en-US" sz="1500" dirty="0" smtClean="0">
+                <a:latin typeface="Courier New" pitchFamily="49" charset="0"/>
+                <a:cs typeface="Courier New" pitchFamily="49" charset="0"/>
+              </a:rPr>
+              <a:t>" type=“fixed“&gt;</a:t>
+            </a:r>
+            <a:br>
+              <a:rPr lang="en-US" sz="1500" dirty="0" smtClean="0">
+                <a:latin typeface="Courier New" pitchFamily="49" charset="0"/>
+                <a:cs typeface="Courier New" pitchFamily="49" charset="0"/>
+              </a:rPr>
+            </a:br>
+            <a:r>
+              <a:rPr lang="en-US" sz="1500" dirty="0" smtClean="0">
+                <a:latin typeface="Courier New" pitchFamily="49" charset="0"/>
+                <a:cs typeface="Courier New" pitchFamily="49" charset="0"/>
+              </a:rPr>
+              <a:t>&lt;parent link=“world"/&gt;</a:t>
+            </a:r>
+            <a:br>
+              <a:rPr lang="en-US" sz="1500" dirty="0" smtClean="0">
+                <a:latin typeface="Courier New" pitchFamily="49" charset="0"/>
+                <a:cs typeface="Courier New" pitchFamily="49" charset="0"/>
+              </a:rPr>
+            </a:br>
+            <a:r>
+              <a:rPr lang="en-US" sz="1500" dirty="0" smtClean="0">
+                <a:latin typeface="Courier New" pitchFamily="49" charset="0"/>
+                <a:cs typeface="Courier New" pitchFamily="49" charset="0"/>
+              </a:rPr>
+              <a:t>&lt;child link=“</a:t>
+            </a:r>
+            <a:r>
+              <a:rPr lang="en-US" sz="1500" dirty="0" err="1" smtClean="0">
+                <a:latin typeface="Courier New" pitchFamily="49" charset="0"/>
+                <a:cs typeface="Courier New" pitchFamily="49" charset="0"/>
+              </a:rPr>
+              <a:t>left_base_link</a:t>
+            </a:r>
+            <a:r>
+              <a:rPr lang="en-US" sz="1500" dirty="0" smtClean="0">
+                <a:latin typeface="Courier New" pitchFamily="49" charset="0"/>
+                <a:cs typeface="Courier New" pitchFamily="49" charset="0"/>
+              </a:rPr>
+              <a:t>"/&gt;</a:t>
+            </a:r>
+            <a:br>
+              <a:rPr lang="en-US" sz="1500" dirty="0" smtClean="0">
+                <a:latin typeface="Courier New" pitchFamily="49" charset="0"/>
+                <a:cs typeface="Courier New" pitchFamily="49" charset="0"/>
+              </a:rPr>
+            </a:br>
+            <a:r>
+              <a:rPr lang="en-US" sz="1500" dirty="0" smtClean="0">
+                <a:latin typeface="Courier New" pitchFamily="49" charset="0"/>
+                <a:cs typeface="Courier New" pitchFamily="49" charset="0"/>
+              </a:rPr>
+              <a:t>&lt;origin xyz=“${offset/2} 0 0" </a:t>
+            </a:r>
+            <a:r>
+              <a:rPr lang="en-US" sz="1500" dirty="0" err="1" smtClean="0">
+                <a:latin typeface="Courier New" pitchFamily="49" charset="0"/>
+                <a:cs typeface="Courier New" pitchFamily="49" charset="0"/>
+              </a:rPr>
+              <a:t>rpy</a:t>
+            </a:r>
+            <a:r>
+              <a:rPr lang="en-US" sz="1500" dirty="0" smtClean="0">
+                <a:latin typeface="Courier New" pitchFamily="49" charset="0"/>
+                <a:cs typeface="Courier New" pitchFamily="49" charset="0"/>
+              </a:rPr>
+              <a:t>="0 0 0"/&gt;</a:t>
+            </a:r>
+          </a:p>
+          <a:p>
+            <a:pPr>
+              <a:buNone/>
+            </a:pPr>
+            <a:r>
+              <a:rPr lang="en-US" sz="1500" dirty="0" smtClean="0">
+                <a:latin typeface="Courier New" pitchFamily="49" charset="0"/>
+                <a:cs typeface="Courier New" pitchFamily="49" charset="0"/>
+              </a:rPr>
+              <a:t>&lt;/joint&gt;</a:t>
+            </a:r>
           </a:p>
         </p:txBody>
       </p:sp>
@@ -11475,7 +13191,7 @@
           <a:lstStyle/>
           <a:p>
             <a:r>
-              <a:rPr lang="en-US" dirty="0" smtClean="0"/>
+              <a:rPr lang="en-US" smtClean="0"/>
               <a:t>May 2014</a:t>
             </a:r>
             <a:endParaRPr lang="en-US" dirty="0"/>
@@ -11501,6 +13217,113 @@
               <a:rPr lang="en-US" smtClean="0"/>
               <a:pPr/>
               <a:t>25</a:t>
+            </a:fld>
+            <a:endParaRPr lang="en-US" dirty="0"/>
+          </a:p>
+        </p:txBody>
+      </p:sp>
+    </p:spTree>
+    <p:extLst>
+      <p:ext uri="{BB962C8B-B14F-4D97-AF65-F5344CB8AC3E}">
+        <p14:creationId xmlns="" xmlns:p14="http://schemas.microsoft.com/office/powerpoint/2010/main" val="1036703678"/>
+      </p:ext>
+    </p:extLst>
+  </p:cSld>
+  <p:clrMapOvr>
+    <a:masterClrMapping/>
+  </p:clrMapOvr>
+  <p:timing>
+    <p:tnLst>
+      <p:par>
+        <p:cTn id="1" dur="indefinite" restart="never" nodeType="tmRoot"/>
+      </p:par>
+    </p:tnLst>
+  </p:timing>
+</p:sld>
+</file>
+
+<file path=ppt/slides/slide26.xml><?xml version="1.0" encoding="utf-8"?>
+<p:sld xmlns:a="http://schemas.openxmlformats.org/drawingml/2006/main" xmlns:r="http://schemas.openxmlformats.org/officeDocument/2006/relationships" xmlns:p="http://schemas.openxmlformats.org/presentationml/2006/main">
+  <p:cSld>
+    <p:spTree>
+      <p:nvGrpSpPr>
+        <p:cNvPr id="1" name=""/>
+        <p:cNvGrpSpPr/>
+        <p:nvPr/>
+      </p:nvGrpSpPr>
+      <p:grpSpPr>
+        <a:xfrm>
+          <a:off x="0" y="0"/>
+          <a:ext cx="0" cy="0"/>
+          <a:chOff x="0" y="0"/>
+          <a:chExt cx="0" cy="0"/>
+        </a:xfrm>
+      </p:grpSpPr>
+      <p:sp>
+        <p:nvSpPr>
+          <p:cNvPr id="2" name="Title 1"/>
+          <p:cNvSpPr>
+            <a:spLocks noGrp="1"/>
+          </p:cNvSpPr>
+          <p:nvPr>
+            <p:ph type="title"/>
+          </p:nvPr>
+        </p:nvSpPr>
+        <p:spPr/>
+        <p:txBody>
+          <a:bodyPr/>
+          <a:lstStyle/>
+          <a:p>
+            <a:r>
+              <a:rPr lang="en-US" dirty="0" smtClean="0"/>
+              <a:t>Contact Info.</a:t>
+            </a:r>
+            <a:endParaRPr lang="en-US" dirty="0"/>
+          </a:p>
+        </p:txBody>
+      </p:sp>
+      <p:sp>
+        <p:nvSpPr>
+          <p:cNvPr id="4" name="Date Placeholder 3"/>
+          <p:cNvSpPr>
+            <a:spLocks noGrp="1"/>
+          </p:cNvSpPr>
+          <p:nvPr>
+            <p:ph type="dt" sz="half" idx="10"/>
+          </p:nvPr>
+        </p:nvSpPr>
+        <p:spPr/>
+        <p:txBody>
+          <a:bodyPr/>
+          <a:lstStyle/>
+          <a:p>
+            <a:r>
+              <a:rPr lang="en-US" smtClean="0"/>
+              <a:t>May 2014</a:t>
+            </a:r>
+            <a:endParaRPr lang="en-US" dirty="0"/>
+          </a:p>
+        </p:txBody>
+      </p:sp>
+      <p:sp>
+        <p:nvSpPr>
+          <p:cNvPr id="6" name="Slide Number Placeholder 5"/>
+          <p:cNvSpPr>
+            <a:spLocks noGrp="1"/>
+          </p:cNvSpPr>
+          <p:nvPr>
+            <p:ph type="sldNum" sz="quarter" idx="12"/>
+          </p:nvPr>
+        </p:nvSpPr>
+        <p:spPr/>
+        <p:txBody>
+          <a:bodyPr/>
+          <a:lstStyle/>
+          <a:p>
+            <a:fld id="{D0CFB120-98BB-43C7-AE88-1FF6043327D1}" type="slidenum">
+              <a:rPr lang="en-US" smtClean="0"/>
+              <a:pPr/>
+              <a:t>26</a:t>
             </a:fld>
             <a:endParaRPr lang="en-US" dirty="0"/>
           </a:p>
@@ -11527,15 +13350,15 @@
             <a:noFill/>
           </a:ln>
           <a:extLst>
-            <a:ext uri="{909E8E84-426E-40dd-AFC4-6F175D3DCCD1}">
-              <a14:hiddenFill xmlns:a14="http://schemas.microsoft.com/office/drawing/2010/main">
+            <a:ext uri="{909E8E84-426E-40DD-AFC4-6F175D3DCCD1}">
+              <a14:hiddenFill xmlns="" xmlns:a14="http://schemas.microsoft.com/office/drawing/2010/main">
                 <a:solidFill>
                   <a:srgbClr val="FFFFFF"/>
                 </a:solidFill>
               </a14:hiddenFill>
             </a:ext>
-            <a:ext uri="{91240B29-F687-4f45-9708-019B960494DF}">
-              <a14:hiddenLine xmlns:a14="http://schemas.microsoft.com/office/drawing/2010/main" w="9525">
+            <a:ext uri="{91240B29-F687-4F45-9708-019B960494DF}">
+              <a14:hiddenLine xmlns="" xmlns:a14="http://schemas.microsoft.com/office/drawing/2010/main" w="9525">
                 <a:solidFill>
                   <a:srgbClr val="000000"/>
                 </a:solidFill>
@@ -11916,7 +13739,7 @@
     </p:spTree>
     <p:extLst>
       <p:ext uri="{BB962C8B-B14F-4D97-AF65-F5344CB8AC3E}">
-        <p14:creationId xmlns:p14="http://schemas.microsoft.com/office/powerpoint/2010/main" val="3494386582"/>
+        <p14:creationId xmlns="" xmlns:p14="http://schemas.microsoft.com/office/powerpoint/2010/main" val="3494386582"/>
       </p:ext>
     </p:extLst>
   </p:cSld>
@@ -11926,7 +13749,7 @@
   <p:timing>
     <p:tnLst>
       <p:par>
-        <p:cTn xmlns:p14="http://schemas.microsoft.com/office/powerpoint/2010/main" id="1" dur="indefinite" restart="never" nodeType="tmRoot"/>
+        <p:cTn id="1" dur="indefinite" restart="never" nodeType="tmRoot"/>
       </p:par>
     </p:tnLst>
   </p:timing>
@@ -11997,7 +13820,7 @@
           <a:lstStyle/>
           <a:p>
             <a:r>
-              <a:rPr lang="en-US" dirty="0" smtClean="0"/>
+              <a:rPr lang="en-US" smtClean="0"/>
               <a:t>May 2014</a:t>
             </a:r>
             <a:endParaRPr lang="en-US" dirty="0"/>
@@ -12031,7 +13854,7 @@
     </p:spTree>
     <p:extLst>
       <p:ext uri="{BB962C8B-B14F-4D97-AF65-F5344CB8AC3E}">
-        <p14:creationId xmlns:p14="http://schemas.microsoft.com/office/powerpoint/2010/main" val="1701490475"/>
+        <p14:creationId xmlns="" xmlns:p14="http://schemas.microsoft.com/office/powerpoint/2010/main" val="1701490475"/>
       </p:ext>
     </p:extLst>
   </p:cSld>
@@ -12041,7 +13864,7 @@
   <p:timing>
     <p:tnLst>
       <p:par>
-        <p:cTn xmlns:p14="http://schemas.microsoft.com/office/powerpoint/2010/main" id="1" dur="indefinite" restart="never" nodeType="tmRoot"/>
+        <p:cTn id="1" dur="indefinite" restart="never" nodeType="tmRoot"/>
       </p:par>
     </p:tnLst>
   </p:timing>
@@ -12247,7 +14070,7 @@
           <a:lstStyle/>
           <a:p>
             <a:r>
-              <a:rPr lang="en-US" dirty="0" smtClean="0"/>
+              <a:rPr lang="en-US" smtClean="0"/>
               <a:t>May 2014</a:t>
             </a:r>
             <a:endParaRPr lang="en-US" dirty="0"/>
@@ -12281,7 +14104,7 @@
     </p:spTree>
     <p:extLst>
       <p:ext uri="{BB962C8B-B14F-4D97-AF65-F5344CB8AC3E}">
-        <p14:creationId xmlns:p14="http://schemas.microsoft.com/office/powerpoint/2010/main" val="1036703678"/>
+        <p14:creationId xmlns="" xmlns:p14="http://schemas.microsoft.com/office/powerpoint/2010/main" val="1036703678"/>
       </p:ext>
     </p:extLst>
   </p:cSld>
@@ -12291,7 +14114,7 @@
   <p:timing>
     <p:tnLst>
       <p:par>
-        <p:cTn xmlns:p14="http://schemas.microsoft.com/office/powerpoint/2010/main" id="1" dur="indefinite" restart="never" nodeType="tmRoot"/>
+        <p:cTn id="1" dur="indefinite" restart="never" nodeType="tmRoot"/>
       </p:par>
     </p:tnLst>
   </p:timing>
@@ -12426,7 +14249,7 @@
           <a:lstStyle/>
           <a:p>
             <a:r>
-              <a:rPr lang="en-US" dirty="0" smtClean="0"/>
+              <a:rPr lang="en-US" smtClean="0"/>
               <a:t>May 2014</a:t>
             </a:r>
             <a:endParaRPr lang="en-US" dirty="0"/>
@@ -12962,7 +14785,7 @@
     </p:spTree>
     <p:extLst>
       <p:ext uri="{BB962C8B-B14F-4D97-AF65-F5344CB8AC3E}">
-        <p14:creationId xmlns:p14="http://schemas.microsoft.com/office/powerpoint/2010/main" val="1036703678"/>
+        <p14:creationId xmlns="" xmlns:p14="http://schemas.microsoft.com/office/powerpoint/2010/main" val="1036703678"/>
       </p:ext>
     </p:extLst>
   </p:cSld>
@@ -12972,7 +14795,7 @@
   <p:timing>
     <p:tnLst>
       <p:par>
-        <p:cTn xmlns:p14="http://schemas.microsoft.com/office/powerpoint/2010/main" id="1" dur="indefinite" restart="never" nodeType="tmRoot"/>
+        <p:cTn id="1" dur="indefinite" restart="never" nodeType="tmRoot"/>
       </p:par>
     </p:tnLst>
   </p:timing>
@@ -13041,7 +14864,7 @@
           <a:lstStyle/>
           <a:p>
             <a:r>
-              <a:rPr lang="en-US" dirty="0" smtClean="0"/>
+              <a:rPr lang="en-US" smtClean="0"/>
               <a:t>May 2014</a:t>
             </a:r>
             <a:endParaRPr lang="en-US" dirty="0"/>
@@ -13082,7 +14905,7 @@
     </p:spTree>
     <p:extLst>
       <p:ext uri="{BB962C8B-B14F-4D97-AF65-F5344CB8AC3E}">
-        <p14:creationId xmlns:p14="http://schemas.microsoft.com/office/powerpoint/2010/main" val="4240243667"/>
+        <p14:creationId xmlns="" xmlns:p14="http://schemas.microsoft.com/office/powerpoint/2010/main" val="4240243667"/>
       </p:ext>
     </p:extLst>
   </p:cSld>
@@ -13092,7 +14915,7 @@
   <p:timing>
     <p:tnLst>
       <p:par>
-        <p:cTn xmlns:p14="http://schemas.microsoft.com/office/powerpoint/2010/main" id="1" dur="indefinite" restart="never" nodeType="tmRoot"/>
+        <p:cTn id="1" dur="indefinite" restart="never" nodeType="tmRoot"/>
       </p:par>
     </p:tnLst>
   </p:timing>
@@ -13335,7 +15158,7 @@
           <a:lstStyle/>
           <a:p>
             <a:r>
-              <a:rPr lang="en-US" dirty="0" smtClean="0"/>
+              <a:rPr lang="en-US" smtClean="0"/>
               <a:t>May 2014</a:t>
             </a:r>
             <a:endParaRPr lang="en-US" dirty="0"/>
@@ -13369,7 +15192,7 @@
     </p:spTree>
     <p:extLst>
       <p:ext uri="{BB962C8B-B14F-4D97-AF65-F5344CB8AC3E}">
-        <p14:creationId xmlns:p14="http://schemas.microsoft.com/office/powerpoint/2010/main" val="1036703678"/>
+        <p14:creationId xmlns="" xmlns:p14="http://schemas.microsoft.com/office/powerpoint/2010/main" val="1036703678"/>
       </p:ext>
     </p:extLst>
   </p:cSld>
@@ -13379,7 +15202,7 @@
   <p:timing>
     <p:tnLst>
       <p:par>
-        <p:cTn xmlns:p14="http://schemas.microsoft.com/office/powerpoint/2010/main" id="1" dur="indefinite" restart="never" nodeType="tmRoot"/>
+        <p:cTn id="1" dur="indefinite" restart="never" nodeType="tmRoot"/>
       </p:par>
     </p:tnLst>
   </p:timing>
@@ -13545,7 +15368,7 @@
           <a:lstStyle/>
           <a:p>
             <a:r>
-              <a:rPr lang="en-US" dirty="0" smtClean="0"/>
+              <a:rPr lang="en-US" smtClean="0"/>
               <a:t>May 2014</a:t>
             </a:r>
             <a:endParaRPr lang="en-US" dirty="0"/>
@@ -13579,7 +15402,7 @@
     </p:spTree>
     <p:extLst>
       <p:ext uri="{BB962C8B-B14F-4D97-AF65-F5344CB8AC3E}">
-        <p14:creationId xmlns:p14="http://schemas.microsoft.com/office/powerpoint/2010/main" val="1036703678"/>
+        <p14:creationId xmlns="" xmlns:p14="http://schemas.microsoft.com/office/powerpoint/2010/main" val="1036703678"/>
       </p:ext>
     </p:extLst>
   </p:cSld>
@@ -13589,7 +15412,7 @@
   <p:timing>
     <p:tnLst>
       <p:par>
-        <p:cTn xmlns:p14="http://schemas.microsoft.com/office/powerpoint/2010/main" id="1" dur="indefinite" restart="never" nodeType="tmRoot"/>
+        <p:cTn id="1" dur="indefinite" restart="never" nodeType="tmRoot"/>
       </p:par>
     </p:tnLst>
   </p:timing>
@@ -13724,7 +15547,7 @@
           <a:lstStyle/>
           <a:p>
             <a:r>
-              <a:rPr lang="en-US" dirty="0" smtClean="0"/>
+              <a:rPr lang="en-US" smtClean="0"/>
               <a:t>May 2014</a:t>
             </a:r>
             <a:endParaRPr lang="en-US" dirty="0"/>
@@ -14198,7 +16021,7 @@
     </p:spTree>
     <p:extLst>
       <p:ext uri="{BB962C8B-B14F-4D97-AF65-F5344CB8AC3E}">
-        <p14:creationId xmlns:p14="http://schemas.microsoft.com/office/powerpoint/2010/main" val="1036703678"/>
+        <p14:creationId xmlns="" xmlns:p14="http://schemas.microsoft.com/office/powerpoint/2010/main" val="1036703678"/>
       </p:ext>
     </p:extLst>
   </p:cSld>
@@ -14208,7 +16031,7 @@
   <p:timing>
     <p:tnLst>
       <p:par>
-        <p:cTn xmlns:p14="http://schemas.microsoft.com/office/powerpoint/2010/main" id="1" dur="indefinite" restart="never" nodeType="tmRoot"/>
+        <p:cTn id="1" dur="indefinite" restart="never" nodeType="tmRoot"/>
       </p:par>
     </p:tnLst>
   </p:timing>

</xml_diff>